<commit_message>
Aftermath of Live Demo edits + changes. McGill workshop officially done!
</commit_message>
<xml_diff>
--- a/lectures/Session 3/Session3_Lecture.pptx
+++ b/lectures/Session 3/Session3_Lecture.pptx
@@ -1148,7 +1148,7 @@
   <pc:docChgLst>
     <pc:chgData name="N.D. Barber" userId="2439b294-b381-4911-ad1d-575a5e61005a" providerId="ADAL" clId="{F8B8FF06-F57F-6F44-89B5-3094D49DC0AB}"/>
     <pc:docChg chg="custSel delSld modSld">
-      <pc:chgData name="N.D. Barber" userId="2439b294-b381-4911-ad1d-575a5e61005a" providerId="ADAL" clId="{F8B8FF06-F57F-6F44-89B5-3094D49DC0AB}" dt="2020-07-06T15:54:39.883" v="73" actId="113"/>
+      <pc:chgData name="N.D. Barber" userId="2439b294-b381-4911-ad1d-575a5e61005a" providerId="ADAL" clId="{F8B8FF06-F57F-6F44-89B5-3094D49DC0AB}" dt="2020-07-06T16:14:12.792" v="75" actId="313"/>
       <pc:docMkLst>
         <pc:docMk/>
       </pc:docMkLst>
@@ -1168,13 +1168,13 @@
         </pc:spChg>
       </pc:sldChg>
       <pc:sldChg chg="modSp">
-        <pc:chgData name="N.D. Barber" userId="2439b294-b381-4911-ad1d-575a5e61005a" providerId="ADAL" clId="{F8B8FF06-F57F-6F44-89B5-3094D49DC0AB}" dt="2020-07-06T15:52:46.411" v="50" actId="33524"/>
+        <pc:chgData name="N.D. Barber" userId="2439b294-b381-4911-ad1d-575a5e61005a" providerId="ADAL" clId="{F8B8FF06-F57F-6F44-89B5-3094D49DC0AB}" dt="2020-07-06T16:12:22.291" v="74" actId="313"/>
         <pc:sldMkLst>
           <pc:docMk/>
           <pc:sldMk cId="3982107366" sldId="276"/>
         </pc:sldMkLst>
         <pc:spChg chg="mod">
-          <ac:chgData name="N.D. Barber" userId="2439b294-b381-4911-ad1d-575a5e61005a" providerId="ADAL" clId="{F8B8FF06-F57F-6F44-89B5-3094D49DC0AB}" dt="2020-07-06T15:52:46.411" v="50" actId="33524"/>
+          <ac:chgData name="N.D. Barber" userId="2439b294-b381-4911-ad1d-575a5e61005a" providerId="ADAL" clId="{F8B8FF06-F57F-6F44-89B5-3094D49DC0AB}" dt="2020-07-06T16:12:22.291" v="74" actId="313"/>
           <ac:spMkLst>
             <pc:docMk/>
             <pc:sldMk cId="3982107366" sldId="276"/>
@@ -1210,6 +1210,21 @@
             <pc:docMk/>
             <pc:sldMk cId="1338931758" sldId="277"/>
             <ac:spMk id="8" creationId="{1952B431-84ED-EA48-99FA-614D3EE146A8}"/>
+          </ac:spMkLst>
+        </pc:spChg>
+      </pc:sldChg>
+      <pc:sldChg chg="modSp">
+        <pc:chgData name="N.D. Barber" userId="2439b294-b381-4911-ad1d-575a5e61005a" providerId="ADAL" clId="{F8B8FF06-F57F-6F44-89B5-3094D49DC0AB}" dt="2020-07-06T16:14:12.792" v="75" actId="313"/>
+        <pc:sldMkLst>
+          <pc:docMk/>
+          <pc:sldMk cId="1109333282" sldId="278"/>
+        </pc:sldMkLst>
+        <pc:spChg chg="mod">
+          <ac:chgData name="N.D. Barber" userId="2439b294-b381-4911-ad1d-575a5e61005a" providerId="ADAL" clId="{F8B8FF06-F57F-6F44-89B5-3094D49DC0AB}" dt="2020-07-06T16:14:12.792" v="75" actId="313"/>
+          <ac:spMkLst>
+            <pc:docMk/>
+            <pc:sldMk cId="1109333282" sldId="278"/>
+            <ac:spMk id="3" creationId="{DAB305CE-FF84-504E-A791-57A99FB1C5BB}"/>
           </ac:spMkLst>
         </pc:spChg>
       </pc:sldChg>
@@ -6609,13 +6624,8 @@
             <a:pPr lvl="1"/>
             <a:r>
               <a:rPr lang="en-US" dirty="0"/>
-              <a:t>LANDSAT Mineral </a:t>
-            </a:r>
-            <a:r>
-              <a:rPr lang="en-US" dirty="0" err="1"/>
-              <a:t>Epxloration</a:t>
-            </a:r>
-            <a:endParaRPr lang="en-US" dirty="0"/>
+              <a:t>LANDSAT Mineral Exploration</a:t>
+            </a:r>
           </a:p>
           <a:p>
             <a:pPr lvl="2"/>
@@ -6871,12 +6881,8 @@
           <a:p>
             <a:pPr lvl="1"/>
             <a:r>
-              <a:rPr lang="en-US" dirty="0" err="1"/>
-              <a:t>Adavanced</a:t>
-            </a:r>
-            <a:r>
-              <a:rPr lang="en-US" dirty="0"/>
-              <a:t> Formatting + Symbology</a:t>
+              <a:rPr lang="en-US" dirty="0"/>
+              <a:t>Advanced Formatting + Symbology</a:t>
             </a:r>
           </a:p>
           <a:p>

</xml_diff>

<commit_message>
Post-Session 3 edits, layers, and changes
</commit_message>
<xml_diff>
--- a/lectures/Session 3/Session3_Lecture.pptx
+++ b/lectures/Session 3/Session3_Lecture.pptx
@@ -5,25 +5,26 @@
     <p:sldMasterId id="2147483840" r:id="rId1"/>
   </p:sldMasterIdLst>
   <p:notesMasterIdLst>
-    <p:notesMasterId r:id="rId18"/>
+    <p:notesMasterId r:id="rId19"/>
   </p:notesMasterIdLst>
   <p:sldIdLst>
     <p:sldId id="258" r:id="rId2"/>
     <p:sldId id="275" r:id="rId3"/>
-    <p:sldId id="270" r:id="rId4"/>
-    <p:sldId id="276" r:id="rId5"/>
-    <p:sldId id="278" r:id="rId6"/>
-    <p:sldId id="287" r:id="rId7"/>
-    <p:sldId id="277" r:id="rId8"/>
-    <p:sldId id="279" r:id="rId9"/>
-    <p:sldId id="286" r:id="rId10"/>
-    <p:sldId id="280" r:id="rId11"/>
-    <p:sldId id="289" r:id="rId12"/>
-    <p:sldId id="281" r:id="rId13"/>
-    <p:sldId id="290" r:id="rId14"/>
-    <p:sldId id="282" r:id="rId15"/>
-    <p:sldId id="285" r:id="rId16"/>
-    <p:sldId id="284" r:id="rId17"/>
+    <p:sldId id="291" r:id="rId4"/>
+    <p:sldId id="270" r:id="rId5"/>
+    <p:sldId id="276" r:id="rId6"/>
+    <p:sldId id="278" r:id="rId7"/>
+    <p:sldId id="287" r:id="rId8"/>
+    <p:sldId id="277" r:id="rId9"/>
+    <p:sldId id="279" r:id="rId10"/>
+    <p:sldId id="286" r:id="rId11"/>
+    <p:sldId id="280" r:id="rId12"/>
+    <p:sldId id="289" r:id="rId13"/>
+    <p:sldId id="281" r:id="rId14"/>
+    <p:sldId id="290" r:id="rId15"/>
+    <p:sldId id="282" r:id="rId16"/>
+    <p:sldId id="285" r:id="rId17"/>
+    <p:sldId id="284" r:id="rId18"/>
   </p:sldIdLst>
   <p:sldSz cx="12192000" cy="6858000"/>
   <p:notesSz cx="6858000" cy="9144000"/>
@@ -135,7 +136,7 @@
   <pc:docChgLst>
     <pc:chgData name="N.D. Barber" userId="2439b294-b381-4911-ad1d-575a5e61005a" providerId="ADAL" clId="{155DEF3F-930A-F04A-A267-D129109962A0}"/>
     <pc:docChg chg="undo custSel addSld delSld modSld sldOrd modMainMaster">
-      <pc:chgData name="N.D. Barber" userId="2439b294-b381-4911-ad1d-575a5e61005a" providerId="ADAL" clId="{155DEF3F-930A-F04A-A267-D129109962A0}" dt="2020-08-17T10:58:25.015" v="1026"/>
+      <pc:chgData name="N.D. Barber" userId="2439b294-b381-4911-ad1d-575a5e61005a" providerId="ADAL" clId="{155DEF3F-930A-F04A-A267-D129109962A0}" dt="2020-08-17T14:49:14.597" v="1540" actId="14100"/>
       <pc:docMkLst>
         <pc:docMk/>
       </pc:docMkLst>
@@ -155,13 +156,13 @@
         </pc:spChg>
       </pc:sldChg>
       <pc:sldChg chg="addSp modSp mod">
-        <pc:chgData name="N.D. Barber" userId="2439b294-b381-4911-ad1d-575a5e61005a" providerId="ADAL" clId="{155DEF3F-930A-F04A-A267-D129109962A0}" dt="2020-08-17T09:20:13.249" v="136"/>
+        <pc:chgData name="N.D. Barber" userId="2439b294-b381-4911-ad1d-575a5e61005a" providerId="ADAL" clId="{155DEF3F-930A-F04A-A267-D129109962A0}" dt="2020-08-17T11:44:09.362" v="1042" actId="20577"/>
         <pc:sldMkLst>
           <pc:docMk/>
           <pc:sldMk cId="1534045868" sldId="270"/>
         </pc:sldMkLst>
         <pc:spChg chg="mod">
-          <ac:chgData name="N.D. Barber" userId="2439b294-b381-4911-ad1d-575a5e61005a" providerId="ADAL" clId="{155DEF3F-930A-F04A-A267-D129109962A0}" dt="2020-08-17T09:19:23.796" v="91" actId="400"/>
+          <ac:chgData name="N.D. Barber" userId="2439b294-b381-4911-ad1d-575a5e61005a" providerId="ADAL" clId="{155DEF3F-930A-F04A-A267-D129109962A0}" dt="2020-08-17T11:44:09.362" v="1042" actId="20577"/>
           <ac:spMkLst>
             <pc:docMk/>
             <pc:sldMk cId="1534045868" sldId="270"/>
@@ -255,13 +256,13 @@
         </pc:spChg>
       </pc:sldChg>
       <pc:sldChg chg="addSp modSp mod">
-        <pc:chgData name="N.D. Barber" userId="2439b294-b381-4911-ad1d-575a5e61005a" providerId="ADAL" clId="{155DEF3F-930A-F04A-A267-D129109962A0}" dt="2020-08-17T09:20:16.527" v="138"/>
+        <pc:chgData name="N.D. Barber" userId="2439b294-b381-4911-ad1d-575a5e61005a" providerId="ADAL" clId="{155DEF3F-930A-F04A-A267-D129109962A0}" dt="2020-08-17T13:13:35.540" v="1536" actId="20578"/>
         <pc:sldMkLst>
           <pc:docMk/>
           <pc:sldMk cId="1109333282" sldId="278"/>
         </pc:sldMkLst>
         <pc:spChg chg="mod">
-          <ac:chgData name="N.D. Barber" userId="2439b294-b381-4911-ad1d-575a5e61005a" providerId="ADAL" clId="{155DEF3F-930A-F04A-A267-D129109962A0}" dt="2020-08-17T09:19:49.320" v="134" actId="114"/>
+          <ac:chgData name="N.D. Barber" userId="2439b294-b381-4911-ad1d-575a5e61005a" providerId="ADAL" clId="{155DEF3F-930A-F04A-A267-D129109962A0}" dt="2020-08-17T13:13:35.540" v="1536" actId="20578"/>
           <ac:spMkLst>
             <pc:docMk/>
             <pc:sldMk cId="1109333282" sldId="278"/>
@@ -309,7 +310,7 @@
         </pc:spChg>
       </pc:sldChg>
       <pc:sldChg chg="addSp modSp add mod">
-        <pc:chgData name="N.D. Barber" userId="2439b294-b381-4911-ad1d-575a5e61005a" providerId="ADAL" clId="{155DEF3F-930A-F04A-A267-D129109962A0}" dt="2020-08-17T10:53:58.229" v="883" actId="1076"/>
+        <pc:chgData name="N.D. Barber" userId="2439b294-b381-4911-ad1d-575a5e61005a" providerId="ADAL" clId="{155DEF3F-930A-F04A-A267-D129109962A0}" dt="2020-08-17T14:14:42.603" v="1538" actId="14100"/>
         <pc:sldMkLst>
           <pc:docMk/>
           <pc:sldMk cId="3548231802" sldId="286"/>
@@ -323,7 +324,7 @@
           </ac:spMkLst>
         </pc:spChg>
         <pc:spChg chg="mod">
-          <ac:chgData name="N.D. Barber" userId="2439b294-b381-4911-ad1d-575a5e61005a" providerId="ADAL" clId="{155DEF3F-930A-F04A-A267-D129109962A0}" dt="2020-08-17T10:53:31.910" v="858" actId="20577"/>
+          <ac:chgData name="N.D. Barber" userId="2439b294-b381-4911-ad1d-575a5e61005a" providerId="ADAL" clId="{155DEF3F-930A-F04A-A267-D129109962A0}" dt="2020-08-17T12:17:50.195" v="1535" actId="20577"/>
           <ac:spMkLst>
             <pc:docMk/>
             <pc:sldMk cId="3548231802" sldId="286"/>
@@ -347,7 +348,7 @@
           </ac:picMkLst>
         </pc:picChg>
         <pc:picChg chg="add mod">
-          <ac:chgData name="N.D. Barber" userId="2439b294-b381-4911-ad1d-575a5e61005a" providerId="ADAL" clId="{155DEF3F-930A-F04A-A267-D129109962A0}" dt="2020-08-17T10:52:38.500" v="796" actId="1076"/>
+          <ac:chgData name="N.D. Barber" userId="2439b294-b381-4911-ad1d-575a5e61005a" providerId="ADAL" clId="{155DEF3F-930A-F04A-A267-D129109962A0}" dt="2020-08-17T14:14:42.603" v="1538" actId="14100"/>
           <ac:picMkLst>
             <pc:docMk/>
             <pc:sldMk cId="3548231802" sldId="286"/>
@@ -410,7 +411,7 @@
         </pc:spChg>
       </pc:sldChg>
       <pc:sldChg chg="addSp delSp modSp add mod">
-        <pc:chgData name="N.D. Barber" userId="2439b294-b381-4911-ad1d-575a5e61005a" providerId="ADAL" clId="{155DEF3F-930A-F04A-A267-D129109962A0}" dt="2020-08-17T10:54:36.210" v="895" actId="1076"/>
+        <pc:chgData name="N.D. Barber" userId="2439b294-b381-4911-ad1d-575a5e61005a" providerId="ADAL" clId="{155DEF3F-930A-F04A-A267-D129109962A0}" dt="2020-08-17T14:49:14.597" v="1540" actId="14100"/>
         <pc:sldMkLst>
           <pc:docMk/>
           <pc:sldMk cId="3227073904" sldId="289"/>
@@ -432,7 +433,7 @@
           </ac:spMkLst>
         </pc:spChg>
         <pc:picChg chg="add mod">
-          <ac:chgData name="N.D. Barber" userId="2439b294-b381-4911-ad1d-575a5e61005a" providerId="ADAL" clId="{155DEF3F-930A-F04A-A267-D129109962A0}" dt="2020-08-17T10:54:36.210" v="895" actId="1076"/>
+          <ac:chgData name="N.D. Barber" userId="2439b294-b381-4911-ad1d-575a5e61005a" providerId="ADAL" clId="{155DEF3F-930A-F04A-A267-D129109962A0}" dt="2020-08-17T14:49:14.597" v="1540" actId="14100"/>
           <ac:picMkLst>
             <pc:docMk/>
             <pc:sldMk cId="3227073904" sldId="289"/>
@@ -470,6 +471,45 @@
             <ac:spMk id="5" creationId="{CEBD24D7-BAC7-294E-9370-BAD2D7800611}"/>
           </ac:spMkLst>
         </pc:spChg>
+      </pc:sldChg>
+      <pc:sldChg chg="addSp modSp add mod ord">
+        <pc:chgData name="N.D. Barber" userId="2439b294-b381-4911-ad1d-575a5e61005a" providerId="ADAL" clId="{155DEF3F-930A-F04A-A267-D129109962A0}" dt="2020-08-17T11:51:20.620" v="1411"/>
+        <pc:sldMkLst>
+          <pc:docMk/>
+          <pc:sldMk cId="528329236" sldId="291"/>
+        </pc:sldMkLst>
+        <pc:spChg chg="mod">
+          <ac:chgData name="N.D. Barber" userId="2439b294-b381-4911-ad1d-575a5e61005a" providerId="ADAL" clId="{155DEF3F-930A-F04A-A267-D129109962A0}" dt="2020-08-17T11:44:25.319" v="1058" actId="20577"/>
+          <ac:spMkLst>
+            <pc:docMk/>
+            <pc:sldMk cId="528329236" sldId="291"/>
+            <ac:spMk id="2" creationId="{D702DAE0-CE78-6D4F-B83E-1CE269CCDA44}"/>
+          </ac:spMkLst>
+        </pc:spChg>
+        <pc:spChg chg="mod">
+          <ac:chgData name="N.D. Barber" userId="2439b294-b381-4911-ad1d-575a5e61005a" providerId="ADAL" clId="{155DEF3F-930A-F04A-A267-D129109962A0}" dt="2020-08-17T11:50:41.027" v="1410" actId="20577"/>
+          <ac:spMkLst>
+            <pc:docMk/>
+            <pc:sldMk cId="528329236" sldId="291"/>
+            <ac:spMk id="3" creationId="{CE97C9BC-88BC-914F-A032-AFBB2AB8A102}"/>
+          </ac:spMkLst>
+        </pc:spChg>
+        <pc:spChg chg="mod">
+          <ac:chgData name="N.D. Barber" userId="2439b294-b381-4911-ad1d-575a5e61005a" providerId="ADAL" clId="{155DEF3F-930A-F04A-A267-D129109962A0}" dt="2020-08-17T11:43:49.046" v="1028" actId="27636"/>
+          <ac:spMkLst>
+            <pc:docMk/>
+            <pc:sldMk cId="528329236" sldId="291"/>
+            <ac:spMk id="5" creationId="{40B24145-4A2B-4D41-87BF-19ADD96E0560}"/>
+          </ac:spMkLst>
+        </pc:spChg>
+        <pc:picChg chg="add mod">
+          <ac:chgData name="N.D. Barber" userId="2439b294-b381-4911-ad1d-575a5e61005a" providerId="ADAL" clId="{155DEF3F-930A-F04A-A267-D129109962A0}" dt="2020-08-17T11:46:35.609" v="1151" actId="1076"/>
+          <ac:picMkLst>
+            <pc:docMk/>
+            <pc:sldMk cId="528329236" sldId="291"/>
+            <ac:picMk id="8" creationId="{5B9FEA42-1711-BB40-923D-F2F6C7CC5D4C}"/>
+          </ac:picMkLst>
+        </pc:picChg>
       </pc:sldChg>
       <pc:sldMasterChg chg="addSp delSp modSp mod modSldLayout">
         <pc:chgData name="N.D. Barber" userId="2439b294-b381-4911-ad1d-575a5e61005a" providerId="ADAL" clId="{155DEF3F-930A-F04A-A267-D129109962A0}" dt="2020-08-17T09:18:38.525" v="64"/>
@@ -6781,7 +6821,7 @@
           <p:cNvPr id="2" name="Title 1">
             <a:extLst>
               <a:ext uri="{FF2B5EF4-FFF2-40B4-BE49-F238E27FC236}">
-                <a16:creationId xmlns:a16="http://schemas.microsoft.com/office/drawing/2014/main" id="{E73C7915-CC85-9E40-AA7E-3F0881F6E290}"/>
+                <a16:creationId xmlns:a16="http://schemas.microsoft.com/office/drawing/2014/main" id="{FD6C7A8A-0B0E-BC40-BBB3-A2EBA505A425}"/>
               </a:ext>
             </a:extLst>
           </p:cNvPr>
@@ -6798,18 +6838,19 @@
           <a:lstStyle/>
           <a:p>
             <a:r>
-              <a:rPr lang="en-US" dirty="0"/>
-              <a:t>Section 2</a:t>
-            </a:r>
-          </a:p>
-        </p:txBody>
-      </p:sp>
-      <p:sp>
-        <p:nvSpPr>
-          <p:cNvPr id="3" name="Text Placeholder 2">
+              <a:rPr lang="en-US" dirty="0" err="1"/>
+              <a:t>Geostatistics</a:t>
+            </a:r>
+            <a:endParaRPr lang="en-US" dirty="0"/>
+          </a:p>
+        </p:txBody>
+      </p:sp>
+      <p:sp>
+        <p:nvSpPr>
+          <p:cNvPr id="3" name="Content Placeholder 2">
             <a:extLst>
               <a:ext uri="{FF2B5EF4-FFF2-40B4-BE49-F238E27FC236}">
-                <a16:creationId xmlns:a16="http://schemas.microsoft.com/office/drawing/2014/main" id="{1A3DBBD6-115A-774E-A5E1-F125CFEC5E82}"/>
+                <a16:creationId xmlns:a16="http://schemas.microsoft.com/office/drawing/2014/main" id="{A427FE3F-49D5-C247-8E68-29AF7BBD2494}"/>
               </a:ext>
             </a:extLst>
           </p:cNvPr>
@@ -6817,15 +6858,86 @@
             <a:spLocks noGrp="1"/>
           </p:cNvSpPr>
           <p:nvPr>
-            <p:ph type="body" idx="1"/>
-          </p:nvPr>
-        </p:nvSpPr>
-        <p:spPr/>
-        <p:txBody>
-          <a:bodyPr/>
+            <p:ph idx="1"/>
+          </p:nvPr>
+        </p:nvSpPr>
+        <p:spPr>
+          <a:xfrm>
+            <a:off x="1261872" y="1828800"/>
+            <a:ext cx="4636008" cy="4351337"/>
+          </a:xfrm>
+        </p:spPr>
+        <p:txBody>
+          <a:bodyPr>
+            <a:normAutofit fontScale="92500" lnSpcReduction="20000"/>
+          </a:bodyPr>
           <a:lstStyle/>
           <a:p>
-            <a:endParaRPr lang="en-US"/>
+            <a:r>
+              <a:rPr lang="en-US" dirty="0"/>
+              <a:t>Free AMAZING resource: </a:t>
+            </a:r>
+            <a:r>
+              <a:rPr lang="en-US" dirty="0">
+                <a:hlinkClick r:id="rId2"/>
+              </a:rPr>
+              <a:t>https://www.spatialanalysisonline.com/HTML/index.html</a:t>
+            </a:r>
+            <a:endParaRPr lang="en-US" dirty="0"/>
+          </a:p>
+          <a:p>
+            <a:r>
+              <a:rPr lang="en-US" dirty="0"/>
+              <a:t>One key feature of spatial statistics: because of </a:t>
+            </a:r>
+            <a:r>
+              <a:rPr lang="en-US" i="1" dirty="0"/>
+              <a:t>spatial autocorrelation</a:t>
+            </a:r>
+            <a:r>
+              <a:rPr lang="en-US" dirty="0"/>
+              <a:t>, </a:t>
+            </a:r>
+            <a:r>
+              <a:rPr lang="en-US" u="sng" dirty="0"/>
+              <a:t>data with a spatial dimension violate classical statistical assumption of independence</a:t>
+            </a:r>
+          </a:p>
+          <a:p>
+            <a:pPr lvl="1"/>
+            <a:r>
+              <a:rPr lang="en-US" dirty="0"/>
+              <a:t>Independence – in probability theory, occurrence of event does not affect the probability of occurrence of another</a:t>
+            </a:r>
+          </a:p>
+          <a:p>
+            <a:pPr lvl="1"/>
+            <a:r>
+              <a:rPr lang="en-US" dirty="0"/>
+              <a:t>Requires different approach to statistics and analysis</a:t>
+            </a:r>
+          </a:p>
+          <a:p>
+            <a:r>
+              <a:rPr lang="en-US" dirty="0"/>
+              <a:t>Special geostatistical operations: Inverse Distance Weighting (IDW), Kriging, Moran’s I coefficient </a:t>
+            </a:r>
+          </a:p>
+          <a:p>
+            <a:r>
+              <a:rPr lang="en-US" dirty="0"/>
+              <a:t>My Deccan work: </a:t>
+            </a:r>
+            <a:r>
+              <a:rPr lang="en-US" dirty="0">
+                <a:hlinkClick r:id="rId3"/>
+              </a:rPr>
+              <a:t>Empirical Bayesian Kriging</a:t>
+            </a:r>
+            <a:r>
+              <a:rPr lang="en-US" dirty="0"/>
+              <a:t> (EBK) &gt;&gt;&gt;&gt;</a:t>
+            </a:r>
           </a:p>
         </p:txBody>
       </p:sp>
@@ -6834,7 +6946,7 @@
           <p:cNvPr id="4" name="Date Placeholder 3">
             <a:extLst>
               <a:ext uri="{FF2B5EF4-FFF2-40B4-BE49-F238E27FC236}">
-                <a16:creationId xmlns:a16="http://schemas.microsoft.com/office/drawing/2014/main" id="{C1ABD5A6-4818-8E43-B2D7-487D0F12D677}"/>
+                <a16:creationId xmlns:a16="http://schemas.microsoft.com/office/drawing/2014/main" id="{1F076563-1615-8340-8162-97DB4650B039}"/>
               </a:ext>
             </a:extLst>
           </p:cNvPr>
@@ -6850,7 +6962,7 @@
           <a:bodyPr/>
           <a:lstStyle/>
           <a:p>
-            <a:fld id="{453754D5-8BE9-294A-B481-283E1E39E0CC}" type="datetime1">
+            <a:fld id="{0C058645-6F24-9C43-8FC3-443F02031404}" type="datetime1">
               <a:rPr lang="en-US" smtClean="0"/>
               <a:t>8/17/20</a:t>
             </a:fld>
@@ -6863,7 +6975,7 @@
           <p:cNvPr id="5" name="Slide Number Placeholder 4">
             <a:extLst>
               <a:ext uri="{FF2B5EF4-FFF2-40B4-BE49-F238E27FC236}">
-                <a16:creationId xmlns:a16="http://schemas.microsoft.com/office/drawing/2014/main" id="{34888928-534E-5244-99DF-F63281AE9D0B}"/>
+                <a16:creationId xmlns:a16="http://schemas.microsoft.com/office/drawing/2014/main" id="{12047D6E-3B9E-9E45-918B-52E3DB61B3F1}"/>
               </a:ext>
             </a:extLst>
           </p:cNvPr>
@@ -6889,10 +7001,105 @@
           </a:p>
         </p:txBody>
       </p:sp>
+      <p:sp>
+        <p:nvSpPr>
+          <p:cNvPr id="6" name="Footer Placeholder 5">
+            <a:extLst>
+              <a:ext uri="{FF2B5EF4-FFF2-40B4-BE49-F238E27FC236}">
+                <a16:creationId xmlns:a16="http://schemas.microsoft.com/office/drawing/2014/main" id="{991F8F88-5852-5C46-AD49-A5AE62269B22}"/>
+              </a:ext>
+            </a:extLst>
+          </p:cNvPr>
+          <p:cNvSpPr>
+            <a:spLocks noGrp="1"/>
+          </p:cNvSpPr>
+          <p:nvPr>
+            <p:ph type="ftr" sz="quarter" idx="3"/>
+          </p:nvPr>
+        </p:nvSpPr>
+        <p:spPr/>
+        <p:txBody>
+          <a:bodyPr/>
+          <a:lstStyle/>
+          <a:p>
+            <a:r>
+              <a:rPr lang="en-US"/>
+              <a:t>UCL GIS for Geoscientists- Session 3- Intermediate GIS</a:t>
+            </a:r>
+          </a:p>
+          <a:p>
+            <a:r>
+              <a:rPr lang="en-US"/>
+              <a:t>Presented by N.D. Barber (Cambridge) ndb38@cam.ac.uk</a:t>
+            </a:r>
+            <a:endParaRPr lang="en-US" dirty="0"/>
+          </a:p>
+        </p:txBody>
+      </p:sp>
+      <p:pic>
+        <p:nvPicPr>
+          <p:cNvPr id="8" name="Picture 7" descr="A screenshot of a cell phone&#10;&#10;Description automatically generated">
+            <a:extLst>
+              <a:ext uri="{FF2B5EF4-FFF2-40B4-BE49-F238E27FC236}">
+                <a16:creationId xmlns:a16="http://schemas.microsoft.com/office/drawing/2014/main" id="{744C8758-BCAA-1046-AB6D-9E6CBB14EF1E}"/>
+              </a:ext>
+            </a:extLst>
+          </p:cNvPr>
+          <p:cNvPicPr>
+            <a:picLocks noChangeAspect="1"/>
+          </p:cNvPicPr>
+          <p:nvPr/>
+        </p:nvPicPr>
+        <p:blipFill>
+          <a:blip r:embed="rId4"/>
+          <a:stretch>
+            <a:fillRect/>
+          </a:stretch>
+        </p:blipFill>
+        <p:spPr>
+          <a:xfrm>
+            <a:off x="6376527" y="445567"/>
+            <a:ext cx="4276504" cy="3154496"/>
+          </a:xfrm>
+          <a:prstGeom prst="rect">
+            <a:avLst/>
+          </a:prstGeom>
+        </p:spPr>
+      </p:pic>
+      <p:pic>
+        <p:nvPicPr>
+          <p:cNvPr id="9" name="Content Placeholder 7" descr="A close up of a map&#10;&#10;Description automatically generated">
+            <a:extLst>
+              <a:ext uri="{FF2B5EF4-FFF2-40B4-BE49-F238E27FC236}">
+                <a16:creationId xmlns:a16="http://schemas.microsoft.com/office/drawing/2014/main" id="{B33D23CE-246B-A345-85DF-3E495F0D4D49}"/>
+              </a:ext>
+            </a:extLst>
+          </p:cNvPr>
+          <p:cNvPicPr>
+            <a:picLocks noChangeAspect="1"/>
+          </p:cNvPicPr>
+          <p:nvPr/>
+        </p:nvPicPr>
+        <p:blipFill>
+          <a:blip r:embed="rId5"/>
+          <a:stretch>
+            <a:fillRect/>
+          </a:stretch>
+        </p:blipFill>
+        <p:spPr>
+          <a:xfrm>
+            <a:off x="6102934" y="3793524"/>
+            <a:ext cx="4632502" cy="2614790"/>
+          </a:xfrm>
+          <a:prstGeom prst="rect">
+            <a:avLst/>
+          </a:prstGeom>
+        </p:spPr>
+      </p:pic>
     </p:spTree>
     <p:extLst>
       <p:ext uri="{BB962C8B-B14F-4D97-AF65-F5344CB8AC3E}">
-        <p14:creationId xmlns:p14="http://schemas.microsoft.com/office/powerpoint/2010/main" val="2286077533"/>
+        <p14:creationId xmlns:p14="http://schemas.microsoft.com/office/powerpoint/2010/main" val="3548231802"/>
       </p:ext>
     </p:extLst>
   </p:cSld>
@@ -6924,7 +7131,7 @@
           <p:cNvPr id="2" name="Title 1">
             <a:extLst>
               <a:ext uri="{FF2B5EF4-FFF2-40B4-BE49-F238E27FC236}">
-                <a16:creationId xmlns:a16="http://schemas.microsoft.com/office/drawing/2014/main" id="{F809FD02-7E77-FB41-935A-099DF641A3BD}"/>
+                <a16:creationId xmlns:a16="http://schemas.microsoft.com/office/drawing/2014/main" id="{E73C7915-CC85-9E40-AA7E-3F0881F6E290}"/>
               </a:ext>
             </a:extLst>
           </p:cNvPr>
@@ -6940,45 +7147,44 @@
           <a:bodyPr/>
           <a:lstStyle/>
           <a:p>
-            <a:endParaRPr lang="en-US"/>
-          </a:p>
-        </p:txBody>
-      </p:sp>
-      <p:pic>
-        <p:nvPicPr>
-          <p:cNvPr id="8" name="Content Placeholder 7" descr="A picture containing text, newspaper&#10;&#10;Description automatically generated">
+            <a:r>
+              <a:rPr lang="en-US" dirty="0"/>
+              <a:t>Section 2</a:t>
+            </a:r>
+          </a:p>
+        </p:txBody>
+      </p:sp>
+      <p:sp>
+        <p:nvSpPr>
+          <p:cNvPr id="3" name="Text Placeholder 2">
             <a:extLst>
               <a:ext uri="{FF2B5EF4-FFF2-40B4-BE49-F238E27FC236}">
-                <a16:creationId xmlns:a16="http://schemas.microsoft.com/office/drawing/2014/main" id="{DB9853F3-2614-3341-A43D-F2820205773A}"/>
+                <a16:creationId xmlns:a16="http://schemas.microsoft.com/office/drawing/2014/main" id="{1A3DBBD6-115A-774E-A5E1-F125CFEC5E82}"/>
               </a:ext>
             </a:extLst>
           </p:cNvPr>
-          <p:cNvPicPr>
-            <a:picLocks noGrp="1" noChangeAspect="1"/>
-          </p:cNvPicPr>
-          <p:nvPr>
-            <p:ph idx="1"/>
-          </p:nvPr>
-        </p:nvPicPr>
-        <p:blipFill>
-          <a:blip r:embed="rId2"/>
-          <a:stretch>
-            <a:fillRect/>
-          </a:stretch>
-        </p:blipFill>
-        <p:spPr>
-          <a:xfrm>
-            <a:off x="3124200" y="270581"/>
-            <a:ext cx="4876969" cy="6316838"/>
-          </a:xfrm>
-        </p:spPr>
-      </p:pic>
+          <p:cNvSpPr>
+            <a:spLocks noGrp="1"/>
+          </p:cNvSpPr>
+          <p:nvPr>
+            <p:ph type="body" idx="1"/>
+          </p:nvPr>
+        </p:nvSpPr>
+        <p:spPr/>
+        <p:txBody>
+          <a:bodyPr/>
+          <a:lstStyle/>
+          <a:p>
+            <a:endParaRPr lang="en-US"/>
+          </a:p>
+        </p:txBody>
+      </p:sp>
       <p:sp>
         <p:nvSpPr>
           <p:cNvPr id="4" name="Date Placeholder 3">
             <a:extLst>
               <a:ext uri="{FF2B5EF4-FFF2-40B4-BE49-F238E27FC236}">
-                <a16:creationId xmlns:a16="http://schemas.microsoft.com/office/drawing/2014/main" id="{F3B8E71E-42EC-CC43-B152-2271ECF4334B}"/>
+                <a16:creationId xmlns:a16="http://schemas.microsoft.com/office/drawing/2014/main" id="{C1ABD5A6-4818-8E43-B2D7-487D0F12D677}"/>
               </a:ext>
             </a:extLst>
           </p:cNvPr>
@@ -6994,7 +7200,7 @@
           <a:bodyPr/>
           <a:lstStyle/>
           <a:p>
-            <a:fld id="{0C058645-6F24-9C43-8FC3-443F02031404}" type="datetime1">
+            <a:fld id="{453754D5-8BE9-294A-B481-283E1E39E0CC}" type="datetime1">
               <a:rPr lang="en-US" smtClean="0"/>
               <a:t>8/17/20</a:t>
             </a:fld>
@@ -7007,7 +7213,7 @@
           <p:cNvPr id="5" name="Slide Number Placeholder 4">
             <a:extLst>
               <a:ext uri="{FF2B5EF4-FFF2-40B4-BE49-F238E27FC236}">
-                <a16:creationId xmlns:a16="http://schemas.microsoft.com/office/drawing/2014/main" id="{E140BD1B-6F28-1745-80D3-4B23AD310594}"/>
+                <a16:creationId xmlns:a16="http://schemas.microsoft.com/office/drawing/2014/main" id="{34888928-534E-5244-99DF-F63281AE9D0B}"/>
               </a:ext>
             </a:extLst>
           </p:cNvPr>
@@ -7033,45 +7239,10 @@
           </a:p>
         </p:txBody>
       </p:sp>
-      <p:sp>
-        <p:nvSpPr>
-          <p:cNvPr id="6" name="Footer Placeholder 5">
-            <a:extLst>
-              <a:ext uri="{FF2B5EF4-FFF2-40B4-BE49-F238E27FC236}">
-                <a16:creationId xmlns:a16="http://schemas.microsoft.com/office/drawing/2014/main" id="{FDCAB8DE-95BF-3F4C-BCCD-6BF40B9031F3}"/>
-              </a:ext>
-            </a:extLst>
-          </p:cNvPr>
-          <p:cNvSpPr>
-            <a:spLocks noGrp="1"/>
-          </p:cNvSpPr>
-          <p:nvPr>
-            <p:ph type="ftr" sz="quarter" idx="3"/>
-          </p:nvPr>
-        </p:nvSpPr>
-        <p:spPr/>
-        <p:txBody>
-          <a:bodyPr/>
-          <a:lstStyle/>
-          <a:p>
-            <a:r>
-              <a:rPr lang="en-US"/>
-              <a:t>UCL GIS for Geoscientists- Session 3- Intermediate GIS</a:t>
-            </a:r>
-          </a:p>
-          <a:p>
-            <a:r>
-              <a:rPr lang="en-US"/>
-              <a:t>Presented by N.D. Barber (Cambridge) ndb38@cam.ac.uk</a:t>
-            </a:r>
-            <a:endParaRPr lang="en-US" dirty="0"/>
-          </a:p>
-        </p:txBody>
-      </p:sp>
     </p:spTree>
     <p:extLst>
       <p:ext uri="{BB962C8B-B14F-4D97-AF65-F5344CB8AC3E}">
-        <p14:creationId xmlns:p14="http://schemas.microsoft.com/office/powerpoint/2010/main" val="3227073904"/>
+        <p14:creationId xmlns:p14="http://schemas.microsoft.com/office/powerpoint/2010/main" val="2286077533"/>
       </p:ext>
     </p:extLst>
   </p:cSld>
@@ -7103,7 +7274,7 @@
           <p:cNvPr id="2" name="Title 1">
             <a:extLst>
               <a:ext uri="{FF2B5EF4-FFF2-40B4-BE49-F238E27FC236}">
-                <a16:creationId xmlns:a16="http://schemas.microsoft.com/office/drawing/2014/main" id="{72C44A9B-F735-B54D-B030-262342A89C97}"/>
+                <a16:creationId xmlns:a16="http://schemas.microsoft.com/office/drawing/2014/main" id="{F809FD02-7E77-FB41-935A-099DF641A3BD}"/>
               </a:ext>
             </a:extLst>
           </p:cNvPr>
@@ -7119,44 +7290,45 @@
           <a:bodyPr/>
           <a:lstStyle/>
           <a:p>
-            <a:r>
-              <a:rPr lang="en-US" dirty="0"/>
-              <a:t>Section 3</a:t>
-            </a:r>
-          </a:p>
-        </p:txBody>
-      </p:sp>
-      <p:sp>
-        <p:nvSpPr>
-          <p:cNvPr id="3" name="Text Placeholder 2">
+            <a:endParaRPr lang="en-US"/>
+          </a:p>
+        </p:txBody>
+      </p:sp>
+      <p:pic>
+        <p:nvPicPr>
+          <p:cNvPr id="8" name="Content Placeholder 7" descr="A picture containing text, newspaper&#10;&#10;Description automatically generated">
             <a:extLst>
               <a:ext uri="{FF2B5EF4-FFF2-40B4-BE49-F238E27FC236}">
-                <a16:creationId xmlns:a16="http://schemas.microsoft.com/office/drawing/2014/main" id="{6EDE35EF-D7C9-E34F-AC87-E32EE5EAD359}"/>
+                <a16:creationId xmlns:a16="http://schemas.microsoft.com/office/drawing/2014/main" id="{DB9853F3-2614-3341-A43D-F2820205773A}"/>
               </a:ext>
             </a:extLst>
           </p:cNvPr>
-          <p:cNvSpPr>
-            <a:spLocks noGrp="1"/>
-          </p:cNvSpPr>
-          <p:nvPr>
-            <p:ph type="body" idx="1"/>
-          </p:nvPr>
-        </p:nvSpPr>
-        <p:spPr/>
-        <p:txBody>
-          <a:bodyPr/>
-          <a:lstStyle/>
-          <a:p>
-            <a:endParaRPr lang="en-US"/>
-          </a:p>
-        </p:txBody>
-      </p:sp>
+          <p:cNvPicPr>
+            <a:picLocks noGrp="1" noChangeAspect="1"/>
+          </p:cNvPicPr>
+          <p:nvPr>
+            <p:ph idx="1"/>
+          </p:nvPr>
+        </p:nvPicPr>
+        <p:blipFill>
+          <a:blip r:embed="rId2"/>
+          <a:stretch>
+            <a:fillRect/>
+          </a:stretch>
+        </p:blipFill>
+        <p:spPr>
+          <a:xfrm>
+            <a:off x="2940908" y="33174"/>
+            <a:ext cx="5239265" cy="6786098"/>
+          </a:xfrm>
+        </p:spPr>
+      </p:pic>
       <p:sp>
         <p:nvSpPr>
           <p:cNvPr id="4" name="Date Placeholder 3">
             <a:extLst>
               <a:ext uri="{FF2B5EF4-FFF2-40B4-BE49-F238E27FC236}">
-                <a16:creationId xmlns:a16="http://schemas.microsoft.com/office/drawing/2014/main" id="{2AFA192A-4F71-8E46-87AE-01426B7BE3D6}"/>
+                <a16:creationId xmlns:a16="http://schemas.microsoft.com/office/drawing/2014/main" id="{F3B8E71E-42EC-CC43-B152-2271ECF4334B}"/>
               </a:ext>
             </a:extLst>
           </p:cNvPr>
@@ -7172,7 +7344,7 @@
           <a:bodyPr/>
           <a:lstStyle/>
           <a:p>
-            <a:fld id="{453754D5-8BE9-294A-B481-283E1E39E0CC}" type="datetime1">
+            <a:fld id="{0C058645-6F24-9C43-8FC3-443F02031404}" type="datetime1">
               <a:rPr lang="en-US" smtClean="0"/>
               <a:t>8/17/20</a:t>
             </a:fld>
@@ -7185,7 +7357,7 @@
           <p:cNvPr id="5" name="Slide Number Placeholder 4">
             <a:extLst>
               <a:ext uri="{FF2B5EF4-FFF2-40B4-BE49-F238E27FC236}">
-                <a16:creationId xmlns:a16="http://schemas.microsoft.com/office/drawing/2014/main" id="{34E1838B-A01F-E640-973D-877238FD50EC}"/>
+                <a16:creationId xmlns:a16="http://schemas.microsoft.com/office/drawing/2014/main" id="{E140BD1B-6F28-1745-80D3-4B23AD310594}"/>
               </a:ext>
             </a:extLst>
           </p:cNvPr>
@@ -7211,10 +7383,45 @@
           </a:p>
         </p:txBody>
       </p:sp>
+      <p:sp>
+        <p:nvSpPr>
+          <p:cNvPr id="6" name="Footer Placeholder 5">
+            <a:extLst>
+              <a:ext uri="{FF2B5EF4-FFF2-40B4-BE49-F238E27FC236}">
+                <a16:creationId xmlns:a16="http://schemas.microsoft.com/office/drawing/2014/main" id="{FDCAB8DE-95BF-3F4C-BCCD-6BF40B9031F3}"/>
+              </a:ext>
+            </a:extLst>
+          </p:cNvPr>
+          <p:cNvSpPr>
+            <a:spLocks noGrp="1"/>
+          </p:cNvSpPr>
+          <p:nvPr>
+            <p:ph type="ftr" sz="quarter" idx="3"/>
+          </p:nvPr>
+        </p:nvSpPr>
+        <p:spPr/>
+        <p:txBody>
+          <a:bodyPr/>
+          <a:lstStyle/>
+          <a:p>
+            <a:r>
+              <a:rPr lang="en-US"/>
+              <a:t>UCL GIS for Geoscientists- Session 3- Intermediate GIS</a:t>
+            </a:r>
+          </a:p>
+          <a:p>
+            <a:r>
+              <a:rPr lang="en-US"/>
+              <a:t>Presented by N.D. Barber (Cambridge) ndb38@cam.ac.uk</a:t>
+            </a:r>
+            <a:endParaRPr lang="en-US" dirty="0"/>
+          </a:p>
+        </p:txBody>
+      </p:sp>
     </p:spTree>
     <p:extLst>
       <p:ext uri="{BB962C8B-B14F-4D97-AF65-F5344CB8AC3E}">
-        <p14:creationId xmlns:p14="http://schemas.microsoft.com/office/powerpoint/2010/main" val="3836933792"/>
+        <p14:creationId xmlns:p14="http://schemas.microsoft.com/office/powerpoint/2010/main" val="3227073904"/>
       </p:ext>
     </p:extLst>
   </p:cSld>
@@ -7246,7 +7453,7 @@
           <p:cNvPr id="2" name="Title 1">
             <a:extLst>
               <a:ext uri="{FF2B5EF4-FFF2-40B4-BE49-F238E27FC236}">
-                <a16:creationId xmlns:a16="http://schemas.microsoft.com/office/drawing/2014/main" id="{02D5D0D7-1158-5040-B035-11B71C02D831}"/>
+                <a16:creationId xmlns:a16="http://schemas.microsoft.com/office/drawing/2014/main" id="{72C44A9B-F735-B54D-B030-262342A89C97}"/>
               </a:ext>
             </a:extLst>
           </p:cNvPr>
@@ -7263,22 +7470,18 @@
           <a:lstStyle/>
           <a:p>
             <a:r>
-              <a:rPr lang="en-US" dirty="0" err="1"/>
-              <a:t>PyQGIS</a:t>
-            </a:r>
-            <a:r>
-              <a:rPr lang="en-US" dirty="0"/>
-              <a:t> Resources</a:t>
-            </a:r>
-          </a:p>
-        </p:txBody>
-      </p:sp>
-      <p:sp>
-        <p:nvSpPr>
-          <p:cNvPr id="3" name="Content Placeholder 2">
+              <a:rPr lang="en-US" dirty="0"/>
+              <a:t>Section 3</a:t>
+            </a:r>
+          </a:p>
+        </p:txBody>
+      </p:sp>
+      <p:sp>
+        <p:nvSpPr>
+          <p:cNvPr id="3" name="Text Placeholder 2">
             <a:extLst>
               <a:ext uri="{FF2B5EF4-FFF2-40B4-BE49-F238E27FC236}">
-                <a16:creationId xmlns:a16="http://schemas.microsoft.com/office/drawing/2014/main" id="{47BF72F7-AC12-C34D-9C3D-A10E48B80699}"/>
+                <a16:creationId xmlns:a16="http://schemas.microsoft.com/office/drawing/2014/main" id="{6EDE35EF-D7C9-E34F-AC87-E32EE5EAD359}"/>
               </a:ext>
             </a:extLst>
           </p:cNvPr>
@@ -7286,7 +7489,7 @@
             <a:spLocks noGrp="1"/>
           </p:cNvSpPr>
           <p:nvPr>
-            <p:ph idx="1"/>
+            <p:ph type="body" idx="1"/>
           </p:nvPr>
         </p:nvSpPr>
         <p:spPr/>
@@ -7294,87 +7497,7 @@
           <a:bodyPr/>
           <a:lstStyle/>
           <a:p>
-            <a:r>
-              <a:rPr lang="en-US" dirty="0"/>
-              <a:t>Beginner friendly tutorial: </a:t>
-            </a:r>
-            <a:r>
-              <a:rPr lang="en-US" dirty="0">
-                <a:solidFill>
-                  <a:srgbClr val="67AABF"/>
-                </a:solidFill>
-                <a:hlinkClick r:id="rId2"/>
-              </a:rPr>
-              <a:t>https://anitagraser.com/pyqgis-101-introduction-to-qgis-python-programming-for-non-programmers/</a:t>
-            </a:r>
-            <a:endParaRPr lang="en-US" dirty="0">
-              <a:solidFill>
-                <a:srgbClr val="67AABF"/>
-              </a:solidFill>
-            </a:endParaRPr>
-          </a:p>
-          <a:p>
-            <a:r>
-              <a:rPr lang="en-US" dirty="0" err="1"/>
-              <a:t>PyQGIS</a:t>
-            </a:r>
-            <a:r>
-              <a:rPr lang="en-US" dirty="0"/>
-              <a:t> Official Cookbook: </a:t>
-            </a:r>
-            <a:r>
-              <a:rPr lang="en-US" dirty="0">
-                <a:hlinkClick r:id="rId3"/>
-              </a:rPr>
-              <a:t>https://docs.qgis.org/testing/en/docs/pyqgis_developer_cookbook/</a:t>
-            </a:r>
-            <a:endParaRPr lang="en-US" dirty="0"/>
-          </a:p>
-          <a:p>
-            <a:r>
-              <a:rPr lang="en-US" dirty="0"/>
-              <a:t>Learn Python in QGIS in a Day: </a:t>
-            </a:r>
-            <a:r>
-              <a:rPr lang="en-US" dirty="0">
-                <a:hlinkClick r:id="rId4"/>
-              </a:rPr>
-              <a:t>https://</a:t>
-            </a:r>
-            <a:r>
-              <a:rPr lang="en-US" dirty="0" err="1">
-                <a:hlinkClick r:id="rId4"/>
-              </a:rPr>
-              <a:t>courses.spatialthoughts.com</a:t>
-            </a:r>
-            <a:r>
-              <a:rPr lang="en-US" dirty="0">
-                <a:hlinkClick r:id="rId4"/>
-              </a:rPr>
-              <a:t>/</a:t>
-            </a:r>
-            <a:r>
-              <a:rPr lang="en-US" dirty="0" err="1">
-                <a:hlinkClick r:id="rId4"/>
-              </a:rPr>
-              <a:t>pyqgis</a:t>
-            </a:r>
-            <a:r>
-              <a:rPr lang="en-US" dirty="0">
-                <a:hlinkClick r:id="rId4"/>
-              </a:rPr>
-              <a:t>-in-a-</a:t>
-            </a:r>
-            <a:r>
-              <a:rPr lang="en-US" dirty="0" err="1">
-                <a:hlinkClick r:id="rId4"/>
-              </a:rPr>
-              <a:t>day.html</a:t>
-            </a:r>
-            <a:endParaRPr lang="en-US" dirty="0"/>
-          </a:p>
-          <a:p>
-            <a:endParaRPr lang="en-US" dirty="0"/>
+            <a:endParaRPr lang="en-US"/>
           </a:p>
         </p:txBody>
       </p:sp>
@@ -7383,7 +7506,7 @@
           <p:cNvPr id="4" name="Date Placeholder 3">
             <a:extLst>
               <a:ext uri="{FF2B5EF4-FFF2-40B4-BE49-F238E27FC236}">
-                <a16:creationId xmlns:a16="http://schemas.microsoft.com/office/drawing/2014/main" id="{025F5342-3251-0243-AFE7-1920DA878238}"/>
+                <a16:creationId xmlns:a16="http://schemas.microsoft.com/office/drawing/2014/main" id="{2AFA192A-4F71-8E46-87AE-01426B7BE3D6}"/>
               </a:ext>
             </a:extLst>
           </p:cNvPr>
@@ -7399,7 +7522,7 @@
           <a:bodyPr/>
           <a:lstStyle/>
           <a:p>
-            <a:fld id="{0C058645-6F24-9C43-8FC3-443F02031404}" type="datetime1">
+            <a:fld id="{453754D5-8BE9-294A-B481-283E1E39E0CC}" type="datetime1">
               <a:rPr lang="en-US" smtClean="0"/>
               <a:t>8/17/20</a:t>
             </a:fld>
@@ -7412,7 +7535,7 @@
           <p:cNvPr id="5" name="Slide Number Placeholder 4">
             <a:extLst>
               <a:ext uri="{FF2B5EF4-FFF2-40B4-BE49-F238E27FC236}">
-                <a16:creationId xmlns:a16="http://schemas.microsoft.com/office/drawing/2014/main" id="{CEBD24D7-BAC7-294E-9370-BAD2D7800611}"/>
+                <a16:creationId xmlns:a16="http://schemas.microsoft.com/office/drawing/2014/main" id="{34E1838B-A01F-E640-973D-877238FD50EC}"/>
               </a:ext>
             </a:extLst>
           </p:cNvPr>
@@ -7438,45 +7561,10 @@
           </a:p>
         </p:txBody>
       </p:sp>
-      <p:sp>
-        <p:nvSpPr>
-          <p:cNvPr id="6" name="Footer Placeholder 5">
-            <a:extLst>
-              <a:ext uri="{FF2B5EF4-FFF2-40B4-BE49-F238E27FC236}">
-                <a16:creationId xmlns:a16="http://schemas.microsoft.com/office/drawing/2014/main" id="{2B7CD493-98FF-F544-936A-C9D99CE8D3FB}"/>
-              </a:ext>
-            </a:extLst>
-          </p:cNvPr>
-          <p:cNvSpPr>
-            <a:spLocks noGrp="1"/>
-          </p:cNvSpPr>
-          <p:nvPr>
-            <p:ph type="ftr" sz="quarter" idx="3"/>
-          </p:nvPr>
-        </p:nvSpPr>
-        <p:spPr/>
-        <p:txBody>
-          <a:bodyPr/>
-          <a:lstStyle/>
-          <a:p>
-            <a:r>
-              <a:rPr lang="en-US"/>
-              <a:t>UCL GIS for Geoscientists- Session 3- Intermediate GIS</a:t>
-            </a:r>
-          </a:p>
-          <a:p>
-            <a:r>
-              <a:rPr lang="en-US"/>
-              <a:t>Presented by N.D. Barber (Cambridge) ndb38@cam.ac.uk</a:t>
-            </a:r>
-            <a:endParaRPr lang="en-US" dirty="0"/>
-          </a:p>
-        </p:txBody>
-      </p:sp>
     </p:spTree>
     <p:extLst>
       <p:ext uri="{BB962C8B-B14F-4D97-AF65-F5344CB8AC3E}">
-        <p14:creationId xmlns:p14="http://schemas.microsoft.com/office/powerpoint/2010/main" val="3394649118"/>
+        <p14:creationId xmlns:p14="http://schemas.microsoft.com/office/powerpoint/2010/main" val="3836933792"/>
       </p:ext>
     </p:extLst>
   </p:cSld>
@@ -7508,7 +7596,7 @@
           <p:cNvPr id="2" name="Title 1">
             <a:extLst>
               <a:ext uri="{FF2B5EF4-FFF2-40B4-BE49-F238E27FC236}">
-                <a16:creationId xmlns:a16="http://schemas.microsoft.com/office/drawing/2014/main" id="{4892FDEF-BB20-2640-AE33-EF3C356CA4C2}"/>
+                <a16:creationId xmlns:a16="http://schemas.microsoft.com/office/drawing/2014/main" id="{02D5D0D7-1158-5040-B035-11B71C02D831}"/>
               </a:ext>
             </a:extLst>
           </p:cNvPr>
@@ -7525,18 +7613,22 @@
           <a:lstStyle/>
           <a:p>
             <a:r>
-              <a:rPr lang="en-US" dirty="0"/>
-              <a:t>Final Thoughts</a:t>
-            </a:r>
-          </a:p>
-        </p:txBody>
-      </p:sp>
-      <p:sp>
-        <p:nvSpPr>
-          <p:cNvPr id="3" name="Text Placeholder 2">
+              <a:rPr lang="en-US" dirty="0" err="1"/>
+              <a:t>PyQGIS</a:t>
+            </a:r>
+            <a:r>
+              <a:rPr lang="en-US" dirty="0"/>
+              <a:t> Resources</a:t>
+            </a:r>
+          </a:p>
+        </p:txBody>
+      </p:sp>
+      <p:sp>
+        <p:nvSpPr>
+          <p:cNvPr id="3" name="Content Placeholder 2">
             <a:extLst>
               <a:ext uri="{FF2B5EF4-FFF2-40B4-BE49-F238E27FC236}">
-                <a16:creationId xmlns:a16="http://schemas.microsoft.com/office/drawing/2014/main" id="{1B0A57AD-5209-A842-9D75-5F0838EC0D81}"/>
+                <a16:creationId xmlns:a16="http://schemas.microsoft.com/office/drawing/2014/main" id="{47BF72F7-AC12-C34D-9C3D-A10E48B80699}"/>
               </a:ext>
             </a:extLst>
           </p:cNvPr>
@@ -7544,7 +7636,7 @@
             <a:spLocks noGrp="1"/>
           </p:cNvSpPr>
           <p:nvPr>
-            <p:ph type="body" idx="1"/>
+            <p:ph idx="1"/>
           </p:nvPr>
         </p:nvSpPr>
         <p:spPr/>
@@ -7552,7 +7644,87 @@
           <a:bodyPr/>
           <a:lstStyle/>
           <a:p>
-            <a:endParaRPr lang="en-US"/>
+            <a:r>
+              <a:rPr lang="en-US" dirty="0"/>
+              <a:t>Beginner friendly tutorial: </a:t>
+            </a:r>
+            <a:r>
+              <a:rPr lang="en-US" dirty="0">
+                <a:solidFill>
+                  <a:srgbClr val="67AABF"/>
+                </a:solidFill>
+                <a:hlinkClick r:id="rId2"/>
+              </a:rPr>
+              <a:t>https://anitagraser.com/pyqgis-101-introduction-to-qgis-python-programming-for-non-programmers/</a:t>
+            </a:r>
+            <a:endParaRPr lang="en-US" dirty="0">
+              <a:solidFill>
+                <a:srgbClr val="67AABF"/>
+              </a:solidFill>
+            </a:endParaRPr>
+          </a:p>
+          <a:p>
+            <a:r>
+              <a:rPr lang="en-US" dirty="0" err="1"/>
+              <a:t>PyQGIS</a:t>
+            </a:r>
+            <a:r>
+              <a:rPr lang="en-US" dirty="0"/>
+              <a:t> Official Cookbook: </a:t>
+            </a:r>
+            <a:r>
+              <a:rPr lang="en-US" dirty="0">
+                <a:hlinkClick r:id="rId3"/>
+              </a:rPr>
+              <a:t>https://docs.qgis.org/testing/en/docs/pyqgis_developer_cookbook/</a:t>
+            </a:r>
+            <a:endParaRPr lang="en-US" dirty="0"/>
+          </a:p>
+          <a:p>
+            <a:r>
+              <a:rPr lang="en-US" dirty="0"/>
+              <a:t>Learn Python in QGIS in a Day: </a:t>
+            </a:r>
+            <a:r>
+              <a:rPr lang="en-US" dirty="0">
+                <a:hlinkClick r:id="rId4"/>
+              </a:rPr>
+              <a:t>https://</a:t>
+            </a:r>
+            <a:r>
+              <a:rPr lang="en-US" dirty="0" err="1">
+                <a:hlinkClick r:id="rId4"/>
+              </a:rPr>
+              <a:t>courses.spatialthoughts.com</a:t>
+            </a:r>
+            <a:r>
+              <a:rPr lang="en-US" dirty="0">
+                <a:hlinkClick r:id="rId4"/>
+              </a:rPr>
+              <a:t>/</a:t>
+            </a:r>
+            <a:r>
+              <a:rPr lang="en-US" dirty="0" err="1">
+                <a:hlinkClick r:id="rId4"/>
+              </a:rPr>
+              <a:t>pyqgis</a:t>
+            </a:r>
+            <a:r>
+              <a:rPr lang="en-US" dirty="0">
+                <a:hlinkClick r:id="rId4"/>
+              </a:rPr>
+              <a:t>-in-a-</a:t>
+            </a:r>
+            <a:r>
+              <a:rPr lang="en-US" dirty="0" err="1">
+                <a:hlinkClick r:id="rId4"/>
+              </a:rPr>
+              <a:t>day.html</a:t>
+            </a:r>
+            <a:endParaRPr lang="en-US" dirty="0"/>
+          </a:p>
+          <a:p>
+            <a:endParaRPr lang="en-US" dirty="0"/>
           </a:p>
         </p:txBody>
       </p:sp>
@@ -7561,7 +7733,7 @@
           <p:cNvPr id="4" name="Date Placeholder 3">
             <a:extLst>
               <a:ext uri="{FF2B5EF4-FFF2-40B4-BE49-F238E27FC236}">
-                <a16:creationId xmlns:a16="http://schemas.microsoft.com/office/drawing/2014/main" id="{25DC910F-2CF2-7144-BC19-8EBF79413CA9}"/>
+                <a16:creationId xmlns:a16="http://schemas.microsoft.com/office/drawing/2014/main" id="{025F5342-3251-0243-AFE7-1920DA878238}"/>
               </a:ext>
             </a:extLst>
           </p:cNvPr>
@@ -7577,7 +7749,7 @@
           <a:bodyPr/>
           <a:lstStyle/>
           <a:p>
-            <a:fld id="{453754D5-8BE9-294A-B481-283E1E39E0CC}" type="datetime1">
+            <a:fld id="{0C058645-6F24-9C43-8FC3-443F02031404}" type="datetime1">
               <a:rPr lang="en-US" smtClean="0"/>
               <a:t>8/17/20</a:t>
             </a:fld>
@@ -7590,7 +7762,7 @@
           <p:cNvPr id="5" name="Slide Number Placeholder 4">
             <a:extLst>
               <a:ext uri="{FF2B5EF4-FFF2-40B4-BE49-F238E27FC236}">
-                <a16:creationId xmlns:a16="http://schemas.microsoft.com/office/drawing/2014/main" id="{8C0F5160-A52B-134F-8321-172876D7A8F3}"/>
+                <a16:creationId xmlns:a16="http://schemas.microsoft.com/office/drawing/2014/main" id="{CEBD24D7-BAC7-294E-9370-BAD2D7800611}"/>
               </a:ext>
             </a:extLst>
           </p:cNvPr>
@@ -7616,10 +7788,45 @@
           </a:p>
         </p:txBody>
       </p:sp>
+      <p:sp>
+        <p:nvSpPr>
+          <p:cNvPr id="6" name="Footer Placeholder 5">
+            <a:extLst>
+              <a:ext uri="{FF2B5EF4-FFF2-40B4-BE49-F238E27FC236}">
+                <a16:creationId xmlns:a16="http://schemas.microsoft.com/office/drawing/2014/main" id="{2B7CD493-98FF-F544-936A-C9D99CE8D3FB}"/>
+              </a:ext>
+            </a:extLst>
+          </p:cNvPr>
+          <p:cNvSpPr>
+            <a:spLocks noGrp="1"/>
+          </p:cNvSpPr>
+          <p:nvPr>
+            <p:ph type="ftr" sz="quarter" idx="3"/>
+          </p:nvPr>
+        </p:nvSpPr>
+        <p:spPr/>
+        <p:txBody>
+          <a:bodyPr/>
+          <a:lstStyle/>
+          <a:p>
+            <a:r>
+              <a:rPr lang="en-US"/>
+              <a:t>UCL GIS for Geoscientists- Session 3- Intermediate GIS</a:t>
+            </a:r>
+          </a:p>
+          <a:p>
+            <a:r>
+              <a:rPr lang="en-US"/>
+              <a:t>Presented by N.D. Barber (Cambridge) ndb38@cam.ac.uk</a:t>
+            </a:r>
+            <a:endParaRPr lang="en-US" dirty="0"/>
+          </a:p>
+        </p:txBody>
+      </p:sp>
     </p:spTree>
     <p:extLst>
       <p:ext uri="{BB962C8B-B14F-4D97-AF65-F5344CB8AC3E}">
-        <p14:creationId xmlns:p14="http://schemas.microsoft.com/office/powerpoint/2010/main" val="2817827341"/>
+        <p14:creationId xmlns:p14="http://schemas.microsoft.com/office/powerpoint/2010/main" val="3394649118"/>
       </p:ext>
     </p:extLst>
   </p:cSld>
@@ -7651,7 +7858,7 @@
           <p:cNvPr id="2" name="Title 1">
             <a:extLst>
               <a:ext uri="{FF2B5EF4-FFF2-40B4-BE49-F238E27FC236}">
-                <a16:creationId xmlns:a16="http://schemas.microsoft.com/office/drawing/2014/main" id="{F6DD355A-B1DE-394E-A944-0D553C6E4877}"/>
+                <a16:creationId xmlns:a16="http://schemas.microsoft.com/office/drawing/2014/main" id="{4892FDEF-BB20-2640-AE33-EF3C356CA4C2}"/>
               </a:ext>
             </a:extLst>
           </p:cNvPr>
@@ -7669,17 +7876,17 @@
           <a:p>
             <a:r>
               <a:rPr lang="en-US" dirty="0"/>
-              <a:t>My goals at the start:</a:t>
-            </a:r>
-          </a:p>
-        </p:txBody>
-      </p:sp>
-      <p:sp>
-        <p:nvSpPr>
-          <p:cNvPr id="3" name="Content Placeholder 2">
+              <a:t>Final Thoughts</a:t>
+            </a:r>
+          </a:p>
+        </p:txBody>
+      </p:sp>
+      <p:sp>
+        <p:nvSpPr>
+          <p:cNvPr id="3" name="Text Placeholder 2">
             <a:extLst>
               <a:ext uri="{FF2B5EF4-FFF2-40B4-BE49-F238E27FC236}">
-                <a16:creationId xmlns:a16="http://schemas.microsoft.com/office/drawing/2014/main" id="{42D5277B-D6A7-9B46-A1D7-07322D4DC192}"/>
+                <a16:creationId xmlns:a16="http://schemas.microsoft.com/office/drawing/2014/main" id="{1B0A57AD-5209-A842-9D75-5F0838EC0D81}"/>
               </a:ext>
             </a:extLst>
           </p:cNvPr>
@@ -7687,7 +7894,7 @@
             <a:spLocks noGrp="1"/>
           </p:cNvSpPr>
           <p:nvPr>
-            <p:ph idx="1"/>
+            <p:ph type="body" idx="1"/>
           </p:nvPr>
         </p:nvSpPr>
         <p:spPr/>
@@ -7695,47 +7902,7 @@
           <a:bodyPr/>
           <a:lstStyle/>
           <a:p>
-            <a:pPr marL="342900" indent="-342900">
-              <a:buFont typeface="+mj-lt"/>
-              <a:buAutoNum type="arabicPeriod"/>
-            </a:pPr>
-            <a:r>
-              <a:rPr lang="en-US" dirty="0"/>
-              <a:t>Highlight what GIS can do for geoscientists</a:t>
-            </a:r>
-          </a:p>
-          <a:p>
-            <a:pPr marL="342900" indent="-342900">
-              <a:buFont typeface="+mj-lt"/>
-              <a:buAutoNum type="arabicPeriod"/>
-            </a:pPr>
-            <a:r>
-              <a:rPr lang="en-US" dirty="0"/>
-              <a:t>Outline the key principles of a geographic information system</a:t>
-            </a:r>
-          </a:p>
-          <a:p>
-            <a:pPr marL="342900" indent="-342900">
-              <a:buFont typeface="+mj-lt"/>
-              <a:buAutoNum type="arabicPeriod"/>
-            </a:pPr>
-            <a:r>
-              <a:rPr lang="en-US" dirty="0"/>
-              <a:t>Providing a fully guided GIS workflow template</a:t>
-            </a:r>
-          </a:p>
-          <a:p>
-            <a:pPr marL="342900" indent="-342900">
-              <a:buFont typeface="+mj-lt"/>
-              <a:buAutoNum type="arabicPeriod"/>
-            </a:pPr>
-            <a:r>
-              <a:rPr lang="en-US" dirty="0"/>
-              <a:t>Identify key areas of growth for GIS in geoscience research</a:t>
-            </a:r>
-          </a:p>
-          <a:p>
-            <a:endParaRPr lang="en-US" dirty="0"/>
+            <a:endParaRPr lang="en-US"/>
           </a:p>
         </p:txBody>
       </p:sp>
@@ -7744,7 +7911,7 @@
           <p:cNvPr id="4" name="Date Placeholder 3">
             <a:extLst>
               <a:ext uri="{FF2B5EF4-FFF2-40B4-BE49-F238E27FC236}">
-                <a16:creationId xmlns:a16="http://schemas.microsoft.com/office/drawing/2014/main" id="{3663C2EB-62D0-A24B-B39B-D1019AE7D826}"/>
+                <a16:creationId xmlns:a16="http://schemas.microsoft.com/office/drawing/2014/main" id="{25DC910F-2CF2-7144-BC19-8EBF79413CA9}"/>
               </a:ext>
             </a:extLst>
           </p:cNvPr>
@@ -7760,7 +7927,7 @@
           <a:bodyPr/>
           <a:lstStyle/>
           <a:p>
-            <a:fld id="{0C058645-6F24-9C43-8FC3-443F02031404}" type="datetime1">
+            <a:fld id="{453754D5-8BE9-294A-B481-283E1E39E0CC}" type="datetime1">
               <a:rPr lang="en-US" smtClean="0"/>
               <a:t>8/17/20</a:t>
             </a:fld>
@@ -7773,7 +7940,7 @@
           <p:cNvPr id="5" name="Slide Number Placeholder 4">
             <a:extLst>
               <a:ext uri="{FF2B5EF4-FFF2-40B4-BE49-F238E27FC236}">
-                <a16:creationId xmlns:a16="http://schemas.microsoft.com/office/drawing/2014/main" id="{14CB9155-EBFD-674B-B601-817944DEC749}"/>
+                <a16:creationId xmlns:a16="http://schemas.microsoft.com/office/drawing/2014/main" id="{8C0F5160-A52B-134F-8321-172876D7A8F3}"/>
               </a:ext>
             </a:extLst>
           </p:cNvPr>
@@ -7802,7 +7969,7 @@
     </p:spTree>
     <p:extLst>
       <p:ext uri="{BB962C8B-B14F-4D97-AF65-F5344CB8AC3E}">
-        <p14:creationId xmlns:p14="http://schemas.microsoft.com/office/powerpoint/2010/main" val="1198860467"/>
+        <p14:creationId xmlns:p14="http://schemas.microsoft.com/office/powerpoint/2010/main" val="2817827341"/>
       </p:ext>
     </p:extLst>
   </p:cSld>
@@ -7834,6 +8001,189 @@
           <p:cNvPr id="2" name="Title 1">
             <a:extLst>
               <a:ext uri="{FF2B5EF4-FFF2-40B4-BE49-F238E27FC236}">
+                <a16:creationId xmlns:a16="http://schemas.microsoft.com/office/drawing/2014/main" id="{F6DD355A-B1DE-394E-A944-0D553C6E4877}"/>
+              </a:ext>
+            </a:extLst>
+          </p:cNvPr>
+          <p:cNvSpPr>
+            <a:spLocks noGrp="1"/>
+          </p:cNvSpPr>
+          <p:nvPr>
+            <p:ph type="title"/>
+          </p:nvPr>
+        </p:nvSpPr>
+        <p:spPr/>
+        <p:txBody>
+          <a:bodyPr/>
+          <a:lstStyle/>
+          <a:p>
+            <a:r>
+              <a:rPr lang="en-US" dirty="0"/>
+              <a:t>My goals at the start:</a:t>
+            </a:r>
+          </a:p>
+        </p:txBody>
+      </p:sp>
+      <p:sp>
+        <p:nvSpPr>
+          <p:cNvPr id="3" name="Content Placeholder 2">
+            <a:extLst>
+              <a:ext uri="{FF2B5EF4-FFF2-40B4-BE49-F238E27FC236}">
+                <a16:creationId xmlns:a16="http://schemas.microsoft.com/office/drawing/2014/main" id="{42D5277B-D6A7-9B46-A1D7-07322D4DC192}"/>
+              </a:ext>
+            </a:extLst>
+          </p:cNvPr>
+          <p:cNvSpPr>
+            <a:spLocks noGrp="1"/>
+          </p:cNvSpPr>
+          <p:nvPr>
+            <p:ph idx="1"/>
+          </p:nvPr>
+        </p:nvSpPr>
+        <p:spPr/>
+        <p:txBody>
+          <a:bodyPr/>
+          <a:lstStyle/>
+          <a:p>
+            <a:pPr marL="342900" indent="-342900">
+              <a:buFont typeface="+mj-lt"/>
+              <a:buAutoNum type="arabicPeriod"/>
+            </a:pPr>
+            <a:r>
+              <a:rPr lang="en-US" dirty="0"/>
+              <a:t>Highlight what GIS can do for geoscientists</a:t>
+            </a:r>
+          </a:p>
+          <a:p>
+            <a:pPr marL="342900" indent="-342900">
+              <a:buFont typeface="+mj-lt"/>
+              <a:buAutoNum type="arabicPeriod"/>
+            </a:pPr>
+            <a:r>
+              <a:rPr lang="en-US" dirty="0"/>
+              <a:t>Outline the key principles of a geographic information system</a:t>
+            </a:r>
+          </a:p>
+          <a:p>
+            <a:pPr marL="342900" indent="-342900">
+              <a:buFont typeface="+mj-lt"/>
+              <a:buAutoNum type="arabicPeriod"/>
+            </a:pPr>
+            <a:r>
+              <a:rPr lang="en-US" dirty="0"/>
+              <a:t>Providing a fully guided GIS workflow template</a:t>
+            </a:r>
+          </a:p>
+          <a:p>
+            <a:pPr marL="342900" indent="-342900">
+              <a:buFont typeface="+mj-lt"/>
+              <a:buAutoNum type="arabicPeriod"/>
+            </a:pPr>
+            <a:r>
+              <a:rPr lang="en-US" dirty="0"/>
+              <a:t>Identify key areas of growth for GIS in geoscience research</a:t>
+            </a:r>
+          </a:p>
+          <a:p>
+            <a:endParaRPr lang="en-US" dirty="0"/>
+          </a:p>
+        </p:txBody>
+      </p:sp>
+      <p:sp>
+        <p:nvSpPr>
+          <p:cNvPr id="4" name="Date Placeholder 3">
+            <a:extLst>
+              <a:ext uri="{FF2B5EF4-FFF2-40B4-BE49-F238E27FC236}">
+                <a16:creationId xmlns:a16="http://schemas.microsoft.com/office/drawing/2014/main" id="{3663C2EB-62D0-A24B-B39B-D1019AE7D826}"/>
+              </a:ext>
+            </a:extLst>
+          </p:cNvPr>
+          <p:cNvSpPr>
+            <a:spLocks noGrp="1"/>
+          </p:cNvSpPr>
+          <p:nvPr>
+            <p:ph type="dt" sz="half" idx="10"/>
+          </p:nvPr>
+        </p:nvSpPr>
+        <p:spPr/>
+        <p:txBody>
+          <a:bodyPr/>
+          <a:lstStyle/>
+          <a:p>
+            <a:fld id="{0C058645-6F24-9C43-8FC3-443F02031404}" type="datetime1">
+              <a:rPr lang="en-US" smtClean="0"/>
+              <a:t>8/17/20</a:t>
+            </a:fld>
+            <a:endParaRPr lang="en-US" dirty="0"/>
+          </a:p>
+        </p:txBody>
+      </p:sp>
+      <p:sp>
+        <p:nvSpPr>
+          <p:cNvPr id="5" name="Slide Number Placeholder 4">
+            <a:extLst>
+              <a:ext uri="{FF2B5EF4-FFF2-40B4-BE49-F238E27FC236}">
+                <a16:creationId xmlns:a16="http://schemas.microsoft.com/office/drawing/2014/main" id="{14CB9155-EBFD-674B-B601-817944DEC749}"/>
+              </a:ext>
+            </a:extLst>
+          </p:cNvPr>
+          <p:cNvSpPr>
+            <a:spLocks noGrp="1"/>
+          </p:cNvSpPr>
+          <p:nvPr>
+            <p:ph type="sldNum" sz="quarter" idx="12"/>
+          </p:nvPr>
+        </p:nvSpPr>
+        <p:spPr/>
+        <p:txBody>
+          <a:bodyPr>
+            <a:normAutofit lnSpcReduction="10000"/>
+          </a:bodyPr>
+          <a:lstStyle/>
+          <a:p>
+            <a:fld id="{4FAB73BC-B049-4115-A692-8D63A059BFB8}" type="slidenum">
+              <a:rPr lang="en-US" smtClean="0"/>
+              <a:t>15</a:t>
+            </a:fld>
+            <a:endParaRPr lang="en-US" dirty="0"/>
+          </a:p>
+        </p:txBody>
+      </p:sp>
+    </p:spTree>
+    <p:extLst>
+      <p:ext uri="{BB962C8B-B14F-4D97-AF65-F5344CB8AC3E}">
+        <p14:creationId xmlns:p14="http://schemas.microsoft.com/office/powerpoint/2010/main" val="1198860467"/>
+      </p:ext>
+    </p:extLst>
+  </p:cSld>
+  <p:clrMapOvr>
+    <a:masterClrMapping/>
+  </p:clrMapOvr>
+</p:sld>
+</file>
+
+<file path=ppt/slides/slide17.xml><?xml version="1.0" encoding="utf-8"?>
+<p:sld xmlns:a="http://schemas.openxmlformats.org/drawingml/2006/main" xmlns:r="http://schemas.openxmlformats.org/officeDocument/2006/relationships" xmlns:p="http://schemas.openxmlformats.org/presentationml/2006/main">
+  <p:cSld>
+    <p:spTree>
+      <p:nvGrpSpPr>
+        <p:cNvPr id="1" name=""/>
+        <p:cNvGrpSpPr/>
+        <p:nvPr/>
+      </p:nvGrpSpPr>
+      <p:grpSpPr>
+        <a:xfrm>
+          <a:off x="0" y="0"/>
+          <a:ext cx="0" cy="0"/>
+          <a:chOff x="0" y="0"/>
+          <a:chExt cx="0" cy="0"/>
+        </a:xfrm>
+      </p:grpSpPr>
+      <p:sp>
+        <p:nvSpPr>
+          <p:cNvPr id="2" name="Title 1">
+            <a:extLst>
+              <a:ext uri="{FF2B5EF4-FFF2-40B4-BE49-F238E27FC236}">
                 <a16:creationId xmlns:a16="http://schemas.microsoft.com/office/drawing/2014/main" id="{E3F3BBB5-7E9F-D04C-A949-3F643F7AED5A}"/>
               </a:ext>
             </a:extLst>
@@ -7969,7 +8319,7 @@
           <a:p>
             <a:fld id="{4FAB73BC-B049-4115-A692-8D63A059BFB8}" type="slidenum">
               <a:rPr lang="en-US" smtClean="0"/>
-              <a:t>15</a:t>
+              <a:t>16</a:t>
             </a:fld>
             <a:endParaRPr lang="en-US" dirty="0"/>
           </a:p>
@@ -8526,7 +8876,7 @@
           <p:cNvPr id="2" name="Title 1">
             <a:extLst>
               <a:ext uri="{FF2B5EF4-FFF2-40B4-BE49-F238E27FC236}">
-                <a16:creationId xmlns:a16="http://schemas.microsoft.com/office/drawing/2014/main" id="{796FB70C-4F2A-E648-A8B8-801C7B0D9DC7}"/>
+                <a16:creationId xmlns:a16="http://schemas.microsoft.com/office/drawing/2014/main" id="{D702DAE0-CE78-6D4F-B83E-1CE269CCDA44}"/>
               </a:ext>
             </a:extLst>
           </p:cNvPr>
@@ -8544,7 +8894,7 @@
           <a:p>
             <a:r>
               <a:rPr lang="en-US" dirty="0"/>
-              <a:t>Previous Sessions Demonstration:</a:t>
+              <a:t>Notes for Today</a:t>
             </a:r>
           </a:p>
         </p:txBody>
@@ -8554,7 +8904,7 @@
           <p:cNvPr id="3" name="Content Placeholder 2">
             <a:extLst>
               <a:ext uri="{FF2B5EF4-FFF2-40B4-BE49-F238E27FC236}">
-                <a16:creationId xmlns:a16="http://schemas.microsoft.com/office/drawing/2014/main" id="{BB985F6C-414B-6C46-AC13-CE425348F9CE}"/>
+                <a16:creationId xmlns:a16="http://schemas.microsoft.com/office/drawing/2014/main" id="{CE97C9BC-88BC-914F-A032-AFBB2AB8A102}"/>
               </a:ext>
             </a:extLst>
           </p:cNvPr>
@@ -8565,68 +8915,82 @@
             <p:ph idx="1"/>
           </p:nvPr>
         </p:nvSpPr>
-        <p:spPr/>
+        <p:spPr>
+          <a:xfrm>
+            <a:off x="1261872" y="1828800"/>
+            <a:ext cx="4945698" cy="4351337"/>
+          </a:xfrm>
+        </p:spPr>
         <p:txBody>
           <a:bodyPr/>
           <a:lstStyle/>
           <a:p>
             <a:r>
               <a:rPr lang="en-US" dirty="0"/>
-              <a:t>Planning a project</a:t>
-            </a:r>
-          </a:p>
-          <a:p>
-            <a:r>
-              <a:rPr lang="en-US" dirty="0"/>
-              <a:t>Finding Data</a:t>
-            </a:r>
-          </a:p>
-          <a:p>
-            <a:r>
-              <a:rPr lang="en-US" dirty="0"/>
-              <a:t>Defining CRS/PCS</a:t>
-            </a:r>
-          </a:p>
-          <a:p>
-            <a:r>
-              <a:rPr lang="en-US" dirty="0"/>
-              <a:t>Initial Import + Projection </a:t>
-            </a:r>
-          </a:p>
-          <a:p>
-            <a:r>
-              <a:rPr lang="en-US" dirty="0"/>
-              <a:t>Georeferencing Images</a:t>
-            </a:r>
-          </a:p>
-          <a:p>
-            <a:r>
-              <a:rPr lang="en-US" dirty="0"/>
-              <a:t>Tracing </a:t>
+              <a:t>NEWLY FOUND PLUGIN: </a:t>
+            </a:r>
+            <a:r>
+              <a:rPr lang="en-US" dirty="0">
+                <a:hlinkClick r:id="rId2"/>
+              </a:rPr>
+              <a:t>SRTM Downloader</a:t>
+            </a:r>
+            <a:endParaRPr lang="en-US" dirty="0"/>
+          </a:p>
+          <a:p>
+            <a:pPr lvl="1"/>
+            <a:r>
+              <a:rPr lang="en-US" dirty="0"/>
+              <a:t>Need NASA </a:t>
             </a:r>
             <a:r>
               <a:rPr lang="en-US" dirty="0" err="1"/>
-              <a:t>Basemaps</a:t>
-            </a:r>
+              <a:t>EarthData</a:t>
+            </a:r>
+            <a:r>
+              <a:rPr lang="en-US" dirty="0"/>
+              <a:t> Account</a:t>
+            </a:r>
+          </a:p>
+          <a:p>
+            <a:pPr lvl="1"/>
+            <a:r>
+              <a:rPr lang="en-US" dirty="0"/>
+              <a:t>Doesn’t replace USGS Earth Explorer</a:t>
+            </a:r>
+          </a:p>
+          <a:p>
+            <a:pPr marL="0" indent="0">
+              <a:buNone/>
+            </a:pPr>
             <a:endParaRPr lang="en-US" dirty="0"/>
           </a:p>
           <a:p>
             <a:r>
               <a:rPr lang="en-US" dirty="0"/>
-              <a:t>Analysis: Geoprocessing, Statistics, Attributes</a:t>
-            </a:r>
-          </a:p>
-          <a:p>
-            <a:r>
-              <a:rPr lang="en-US" dirty="0"/>
-              <a:t>Visualization and Symbology</a:t>
-            </a:r>
-          </a:p>
-          <a:p>
-            <a:r>
-              <a:rPr lang="en-US" strike="sngStrike" dirty="0"/>
-              <a:t>Layout Design</a:t>
-            </a:r>
+              <a:t>Wednesday 1-1 Tutorial Sessions: Sign Up Open!!</a:t>
+            </a:r>
+          </a:p>
+          <a:p>
+            <a:pPr lvl="1"/>
+            <a:r>
+              <a:rPr lang="en-US" dirty="0"/>
+              <a:t>This course has mainly been me talking – this is the chance for us to interact and for me to help you with any GIS topic that crosses your mind!</a:t>
+            </a:r>
+          </a:p>
+          <a:p>
+            <a:pPr lvl="1"/>
+            <a:r>
+              <a:rPr lang="en-US" dirty="0"/>
+              <a:t>Sign Up Link: </a:t>
+            </a:r>
+            <a:r>
+              <a:rPr lang="en-US" dirty="0">
+                <a:hlinkClick r:id="rId3"/>
+              </a:rPr>
+              <a:t>https://doodle.com/meetme/qc/iFKktdhLst</a:t>
+            </a:r>
+            <a:endParaRPr lang="en-US" dirty="0"/>
           </a:p>
         </p:txBody>
       </p:sp>
@@ -8635,7 +8999,7 @@
           <p:cNvPr id="4" name="Date Placeholder 3">
             <a:extLst>
               <a:ext uri="{FF2B5EF4-FFF2-40B4-BE49-F238E27FC236}">
-                <a16:creationId xmlns:a16="http://schemas.microsoft.com/office/drawing/2014/main" id="{FA219F90-D68F-234F-B195-0CAA751C48C1}"/>
+                <a16:creationId xmlns:a16="http://schemas.microsoft.com/office/drawing/2014/main" id="{5961E080-3C63-3C41-8DC8-53D90BD2A120}"/>
               </a:ext>
             </a:extLst>
           </p:cNvPr>
@@ -8661,10 +9025,10 @@
       </p:sp>
       <p:sp>
         <p:nvSpPr>
-          <p:cNvPr id="6" name="Slide Number Placeholder 5">
+          <p:cNvPr id="5" name="Slide Number Placeholder 4">
             <a:extLst>
               <a:ext uri="{FF2B5EF4-FFF2-40B4-BE49-F238E27FC236}">
-                <a16:creationId xmlns:a16="http://schemas.microsoft.com/office/drawing/2014/main" id="{224DD8CA-8D81-0941-9989-FF65858E75D3}"/>
+                <a16:creationId xmlns:a16="http://schemas.microsoft.com/office/drawing/2014/main" id="{40B24145-4A2B-4D41-87BF-19ADD96E0560}"/>
               </a:ext>
             </a:extLst>
           </p:cNvPr>
@@ -8692,10 +9056,10 @@
       </p:sp>
       <p:sp>
         <p:nvSpPr>
-          <p:cNvPr id="7" name="Footer Placeholder 4">
+          <p:cNvPr id="6" name="Footer Placeholder 5">
             <a:extLst>
               <a:ext uri="{FF2B5EF4-FFF2-40B4-BE49-F238E27FC236}">
-                <a16:creationId xmlns:a16="http://schemas.microsoft.com/office/drawing/2014/main" id="{4806680E-D792-E643-9AAD-FCA4F88B3655}"/>
+                <a16:creationId xmlns:a16="http://schemas.microsoft.com/office/drawing/2014/main" id="{16484A0D-8274-3842-BAAF-9051D816CCC9}"/>
               </a:ext>
             </a:extLst>
           </p:cNvPr>
@@ -8706,45 +9070,59 @@
             <p:ph type="ftr" sz="quarter" idx="3"/>
           </p:nvPr>
         </p:nvSpPr>
+        <p:spPr/>
+        <p:txBody>
+          <a:bodyPr/>
+          <a:lstStyle/>
+          <a:p>
+            <a:r>
+              <a:rPr lang="en-US"/>
+              <a:t>UCL GIS for Geoscientists- Session 3- Intermediate GIS</a:t>
+            </a:r>
+          </a:p>
+          <a:p>
+            <a:r>
+              <a:rPr lang="en-US"/>
+              <a:t>Presented by N.D. Barber (Cambridge) ndb38@cam.ac.uk</a:t>
+            </a:r>
+            <a:endParaRPr lang="en-US" dirty="0"/>
+          </a:p>
+        </p:txBody>
+      </p:sp>
+      <p:pic>
+        <p:nvPicPr>
+          <p:cNvPr id="8" name="Picture 7" descr="A screenshot of a video game&#10;&#10;Description automatically generated">
+            <a:extLst>
+              <a:ext uri="{FF2B5EF4-FFF2-40B4-BE49-F238E27FC236}">
+                <a16:creationId xmlns:a16="http://schemas.microsoft.com/office/drawing/2014/main" id="{5B9FEA42-1711-BB40-923D-F2F6C7CC5D4C}"/>
+              </a:ext>
+            </a:extLst>
+          </p:cNvPr>
+          <p:cNvPicPr>
+            <a:picLocks noChangeAspect="1"/>
+          </p:cNvPicPr>
+          <p:nvPr/>
+        </p:nvPicPr>
+        <p:blipFill>
+          <a:blip r:embed="rId4"/>
+          <a:stretch>
+            <a:fillRect/>
+          </a:stretch>
+        </p:blipFill>
         <p:spPr>
-          <a:xfrm rot="16200000">
-            <a:off x="9390931" y="3548149"/>
-            <a:ext cx="4718224" cy="365125"/>
+          <a:xfrm>
+            <a:off x="6788055" y="1057361"/>
+            <a:ext cx="3924300" cy="5346700"/>
           </a:xfrm>
           <a:prstGeom prst="rect">
             <a:avLst/>
           </a:prstGeom>
         </p:spPr>
-        <p:txBody>
-          <a:bodyPr/>
-          <a:lstStyle>
-            <a:lvl1pPr>
-              <a:defRPr sz="1200">
-                <a:solidFill>
-                  <a:schemeClr val="bg1"/>
-                </a:solidFill>
-                <a:latin typeface="Candara" panose="020E0502030303020204" pitchFamily="34" charset="0"/>
-              </a:defRPr>
-            </a:lvl1pPr>
-          </a:lstStyle>
-          <a:p>
-            <a:r>
-              <a:rPr lang="en-US" dirty="0"/>
-              <a:t>UCL GIS for Geoscientists- Session 3- Intermediate GIS</a:t>
-            </a:r>
-          </a:p>
-          <a:p>
-            <a:r>
-              <a:rPr lang="en-US" dirty="0"/>
-              <a:t>Presented by N.D. Barber (Cambridge) ndb38@cam.ac.uk</a:t>
-            </a:r>
-          </a:p>
-        </p:txBody>
-      </p:sp>
+      </p:pic>
     </p:spTree>
     <p:extLst>
       <p:ext uri="{BB962C8B-B14F-4D97-AF65-F5344CB8AC3E}">
-        <p14:creationId xmlns:p14="http://schemas.microsoft.com/office/powerpoint/2010/main" val="1534045868"/>
+        <p14:creationId xmlns:p14="http://schemas.microsoft.com/office/powerpoint/2010/main" val="528329236"/>
       </p:ext>
     </p:extLst>
   </p:cSld>
@@ -8776,7 +9154,7 @@
           <p:cNvPr id="2" name="Title 1">
             <a:extLst>
               <a:ext uri="{FF2B5EF4-FFF2-40B4-BE49-F238E27FC236}">
-                <a16:creationId xmlns:a16="http://schemas.microsoft.com/office/drawing/2014/main" id="{B6924150-A855-644E-93DD-B1A5C2E76B9B}"/>
+                <a16:creationId xmlns:a16="http://schemas.microsoft.com/office/drawing/2014/main" id="{796FB70C-4F2A-E648-A8B8-801C7B0D9DC7}"/>
               </a:ext>
             </a:extLst>
           </p:cNvPr>
@@ -8794,7 +9172,7 @@
           <a:p>
             <a:r>
               <a:rPr lang="en-US" dirty="0"/>
-              <a:t>Today’s Demonstration</a:t>
+              <a:t>Previous Sessions Demonstration:</a:t>
             </a:r>
           </a:p>
         </p:txBody>
@@ -8804,7 +9182,7 @@
           <p:cNvPr id="3" name="Content Placeholder 2">
             <a:extLst>
               <a:ext uri="{FF2B5EF4-FFF2-40B4-BE49-F238E27FC236}">
-                <a16:creationId xmlns:a16="http://schemas.microsoft.com/office/drawing/2014/main" id="{DAB305CE-FF84-504E-A791-57A99FB1C5BB}"/>
+                <a16:creationId xmlns:a16="http://schemas.microsoft.com/office/drawing/2014/main" id="{BB985F6C-414B-6C46-AC13-CE425348F9CE}"/>
               </a:ext>
             </a:extLst>
           </p:cNvPr>
@@ -8822,49 +9200,60 @@
           <a:p>
             <a:r>
               <a:rPr lang="en-US" dirty="0"/>
-              <a:t>What It Won’t Cover</a:t>
-            </a:r>
-          </a:p>
-          <a:p>
-            <a:pPr lvl="1"/>
-            <a:r>
-              <a:rPr lang="en-US" dirty="0"/>
-              <a:t>Advanced Cartography (layout Manager)</a:t>
-            </a:r>
-          </a:p>
-          <a:p>
-            <a:pPr lvl="1"/>
-            <a:r>
-              <a:rPr lang="en-US" dirty="0"/>
-              <a:t>LANDSAT Mineral Exploration</a:t>
-            </a:r>
-          </a:p>
-          <a:p>
-            <a:pPr lvl="2"/>
-            <a:r>
-              <a:rPr lang="en-US" dirty="0"/>
-              <a:t>Too big a topic to cover in a 2-hour course </a:t>
-            </a:r>
-            <a:r>
-              <a:rPr lang="en-US" dirty="0">
-                <a:sym typeface="Wingdings" pitchFamily="2" charset="2"/>
-              </a:rPr>
-              <a:t> </a:t>
+              <a:t>Planning a project</a:t>
+            </a:r>
+          </a:p>
+          <a:p>
+            <a:r>
+              <a:rPr lang="en-US" dirty="0"/>
+              <a:t>Finding Data</a:t>
+            </a:r>
+          </a:p>
+          <a:p>
+            <a:r>
+              <a:rPr lang="en-US" dirty="0"/>
+              <a:t>Defining CRS/PCS</a:t>
+            </a:r>
+          </a:p>
+          <a:p>
+            <a:r>
+              <a:rPr lang="en-US" dirty="0"/>
+              <a:t>Initial Import + Projection </a:t>
+            </a:r>
+          </a:p>
+          <a:p>
+            <a:r>
+              <a:rPr lang="en-US" dirty="0"/>
+              <a:t>Georeferencing Images</a:t>
+            </a:r>
+          </a:p>
+          <a:p>
+            <a:r>
+              <a:rPr lang="en-US" dirty="0"/>
+              <a:t>Tracing </a:t>
+            </a:r>
+            <a:r>
+              <a:rPr lang="en-US" dirty="0" err="1"/>
+              <a:t>Basemaps</a:t>
             </a:r>
             <a:endParaRPr lang="en-US" dirty="0"/>
           </a:p>
           <a:p>
-            <a:pPr lvl="1"/>
-            <a:r>
-              <a:rPr lang="en-US" dirty="0"/>
-              <a:t>Python in QGIS **in great detail**</a:t>
-            </a:r>
-          </a:p>
-          <a:p>
-            <a:pPr lvl="2"/>
-            <a:r>
-              <a:rPr lang="en-US" dirty="0"/>
-              <a:t>I will show functionality, but once you know the basics, the details are self-explanatory</a:t>
+            <a:r>
+              <a:rPr lang="en-US" dirty="0"/>
+              <a:t>Analysis: Geoprocessing, Statistics, Attributes</a:t>
+            </a:r>
+          </a:p>
+          <a:p>
+            <a:r>
+              <a:rPr lang="en-US" dirty="0"/>
+              <a:t>Visualization and Symbology</a:t>
+            </a:r>
+          </a:p>
+          <a:p>
+            <a:r>
+              <a:rPr lang="en-US" dirty="0"/>
+              <a:t>Layout Design &lt;&lt;&lt;&lt; TODAY</a:t>
             </a:r>
           </a:p>
         </p:txBody>
@@ -8874,7 +9263,7 @@
           <p:cNvPr id="4" name="Date Placeholder 3">
             <a:extLst>
               <a:ext uri="{FF2B5EF4-FFF2-40B4-BE49-F238E27FC236}">
-                <a16:creationId xmlns:a16="http://schemas.microsoft.com/office/drawing/2014/main" id="{9832673E-13E5-EB44-B5EE-749A920CDFC9}"/>
+                <a16:creationId xmlns:a16="http://schemas.microsoft.com/office/drawing/2014/main" id="{FA219F90-D68F-234F-B195-0CAA751C48C1}"/>
               </a:ext>
             </a:extLst>
           </p:cNvPr>
@@ -8903,7 +9292,7 @@
           <p:cNvPr id="6" name="Slide Number Placeholder 5">
             <a:extLst>
               <a:ext uri="{FF2B5EF4-FFF2-40B4-BE49-F238E27FC236}">
-                <a16:creationId xmlns:a16="http://schemas.microsoft.com/office/drawing/2014/main" id="{3A4F7F12-B06E-6549-B7D9-357DB5A064CB}"/>
+                <a16:creationId xmlns:a16="http://schemas.microsoft.com/office/drawing/2014/main" id="{224DD8CA-8D81-0941-9989-FF65858E75D3}"/>
               </a:ext>
             </a:extLst>
           </p:cNvPr>
@@ -8934,7 +9323,7 @@
           <p:cNvPr id="7" name="Footer Placeholder 4">
             <a:extLst>
               <a:ext uri="{FF2B5EF4-FFF2-40B4-BE49-F238E27FC236}">
-                <a16:creationId xmlns:a16="http://schemas.microsoft.com/office/drawing/2014/main" id="{E1C3E264-5FCA-4648-94F5-032D2AC9D90B}"/>
+                <a16:creationId xmlns:a16="http://schemas.microsoft.com/office/drawing/2014/main" id="{4806680E-D792-E643-9AAD-FCA4F88B3655}"/>
               </a:ext>
             </a:extLst>
           </p:cNvPr>
@@ -8983,7 +9372,7 @@
     </p:spTree>
     <p:extLst>
       <p:ext uri="{BB962C8B-B14F-4D97-AF65-F5344CB8AC3E}">
-        <p14:creationId xmlns:p14="http://schemas.microsoft.com/office/powerpoint/2010/main" val="3982107366"/>
+        <p14:creationId xmlns:p14="http://schemas.microsoft.com/office/powerpoint/2010/main" val="1534045868"/>
       </p:ext>
     </p:extLst>
   </p:cSld>
@@ -9056,9 +9445,7 @@
         </p:nvSpPr>
         <p:spPr/>
         <p:txBody>
-          <a:bodyPr>
-            <a:normAutofit fontScale="92500" lnSpcReduction="10000"/>
-          </a:bodyPr>
+          <a:bodyPr/>
           <a:lstStyle/>
           <a:p>
             <a:r>
@@ -9077,114 +9464,36 @@
             <a:pPr lvl="1"/>
             <a:r>
               <a:rPr lang="en-US" dirty="0"/>
-              <a:t>LANDSAT Mineral </a:t>
-            </a:r>
-            <a:r>
-              <a:rPr lang="en-US" dirty="0" err="1"/>
-              <a:t>Epxloration</a:t>
+              <a:t>LANDSAT Mineral Exploration</a:t>
+            </a:r>
+          </a:p>
+          <a:p>
+            <a:pPr lvl="2"/>
+            <a:r>
+              <a:rPr lang="en-US" dirty="0"/>
+              <a:t>Too big a topic to cover in a 2-hour course </a:t>
+            </a:r>
+            <a:r>
+              <a:rPr lang="en-US" dirty="0">
+                <a:sym typeface="Wingdings" pitchFamily="2" charset="2"/>
+              </a:rPr>
+              <a:t> </a:t>
             </a:r>
             <a:endParaRPr lang="en-US" dirty="0"/>
           </a:p>
           <a:p>
+            <a:pPr lvl="1"/>
+            <a:r>
+              <a:rPr lang="en-US" dirty="0"/>
+              <a:t>Python in QGIS **in great detail**</a:t>
+            </a:r>
+          </a:p>
+          <a:p>
             <a:pPr lvl="2"/>
             <a:r>
               <a:rPr lang="en-US" dirty="0"/>
-              <a:t>Too big a topic to cover in a 2 hour course</a:t>
-            </a:r>
-          </a:p>
-          <a:p>
-            <a:pPr lvl="1"/>
-            <a:r>
-              <a:rPr lang="en-US" dirty="0"/>
-              <a:t>Python in QGIS **in great detail**</a:t>
-            </a:r>
-          </a:p>
-          <a:p>
-            <a:pPr lvl="2"/>
-            <a:r>
-              <a:rPr lang="en-US" dirty="0"/>
               <a:t>I will show functionality, but once you know the basics, the details are self-explanatory</a:t>
             </a:r>
-          </a:p>
-          <a:p>
-            <a:r>
-              <a:rPr lang="en-US" dirty="0"/>
-              <a:t>What It Will Cover</a:t>
-            </a:r>
-          </a:p>
-          <a:p>
-            <a:pPr lvl="1"/>
-            <a:r>
-              <a:rPr lang="en-US" i="1" dirty="0"/>
-              <a:t>**Layout Management and Map Creation**</a:t>
-            </a:r>
-          </a:p>
-          <a:p>
-            <a:pPr lvl="1"/>
-            <a:r>
-              <a:rPr lang="en-US" dirty="0"/>
-              <a:t>Multiple Data Types Handling/Conversion</a:t>
-            </a:r>
-          </a:p>
-          <a:p>
-            <a:pPr lvl="1"/>
-            <a:r>
-              <a:rPr lang="en-US" dirty="0"/>
-              <a:t>CSV + Raster Manipulation</a:t>
-            </a:r>
-          </a:p>
-          <a:p>
-            <a:pPr lvl="1"/>
-            <a:r>
-              <a:rPr lang="en-US" dirty="0" err="1"/>
-              <a:t>Geostatistics</a:t>
-            </a:r>
-            <a:endParaRPr lang="en-US" dirty="0"/>
-          </a:p>
-          <a:p>
-            <a:pPr lvl="1"/>
-            <a:r>
-              <a:rPr lang="en-US" dirty="0"/>
-              <a:t>Raster Statistics + Zonal Statistics</a:t>
-            </a:r>
-          </a:p>
-          <a:p>
-            <a:pPr lvl="1"/>
-            <a:r>
-              <a:rPr lang="en-US" dirty="0"/>
-              <a:t>Advanced Formatting + Symbology</a:t>
-            </a:r>
-          </a:p>
-          <a:p>
-            <a:pPr lvl="1"/>
-            <a:r>
-              <a:rPr lang="en-US" dirty="0"/>
-              <a:t>DEM Visualization</a:t>
-            </a:r>
-          </a:p>
-          <a:p>
-            <a:pPr lvl="1"/>
-            <a:r>
-              <a:rPr lang="en-US" dirty="0"/>
-              <a:t>Web Database Connections</a:t>
-            </a:r>
-          </a:p>
-          <a:p>
-            <a:pPr lvl="1"/>
-            <a:r>
-              <a:rPr lang="en-US" dirty="0"/>
-              <a:t>Basics of Python in QGIS</a:t>
-            </a:r>
-          </a:p>
-          <a:p>
-            <a:pPr lvl="2"/>
-            <a:endParaRPr lang="en-US" dirty="0"/>
-          </a:p>
-          <a:p>
-            <a:pPr marL="548640" lvl="2" indent="0">
-              <a:buNone/>
-            </a:pPr>
-            <a:endParaRPr lang="en-US" dirty="0"/>
           </a:p>
         </p:txBody>
       </p:sp>
@@ -9253,7 +9562,7 @@
           <p:cNvPr id="7" name="Footer Placeholder 4">
             <a:extLst>
               <a:ext uri="{FF2B5EF4-FFF2-40B4-BE49-F238E27FC236}">
-                <a16:creationId xmlns:a16="http://schemas.microsoft.com/office/drawing/2014/main" id="{02C3649A-5040-F04B-A726-FEA28F3C30FF}"/>
+                <a16:creationId xmlns:a16="http://schemas.microsoft.com/office/drawing/2014/main" id="{E1C3E264-5FCA-4648-94F5-032D2AC9D90B}"/>
               </a:ext>
             </a:extLst>
           </p:cNvPr>
@@ -9302,7 +9611,7 @@
     </p:spTree>
     <p:extLst>
       <p:ext uri="{BB962C8B-B14F-4D97-AF65-F5344CB8AC3E}">
-        <p14:creationId xmlns:p14="http://schemas.microsoft.com/office/powerpoint/2010/main" val="1109333282"/>
+        <p14:creationId xmlns:p14="http://schemas.microsoft.com/office/powerpoint/2010/main" val="3982107366"/>
       </p:ext>
     </p:extLst>
   </p:cSld>
@@ -9334,7 +9643,7 @@
           <p:cNvPr id="2" name="Title 1">
             <a:extLst>
               <a:ext uri="{FF2B5EF4-FFF2-40B4-BE49-F238E27FC236}">
-                <a16:creationId xmlns:a16="http://schemas.microsoft.com/office/drawing/2014/main" id="{59A8B2AC-352B-8F4A-9D7A-6C546DE1107B}"/>
+                <a16:creationId xmlns:a16="http://schemas.microsoft.com/office/drawing/2014/main" id="{B6924150-A855-644E-93DD-B1A5C2E76B9B}"/>
               </a:ext>
             </a:extLst>
           </p:cNvPr>
@@ -9352,15 +9661,158 @@
           <a:p>
             <a:r>
               <a:rPr lang="en-US" dirty="0"/>
-              <a:t>Finishing Up From Session 2: </a:t>
-            </a:r>
-            <a:br>
-              <a:rPr lang="en-US" dirty="0"/>
-            </a:br>
-            <a:r>
-              <a:rPr lang="en-US" dirty="0"/>
-              <a:t>Layout</a:t>
-            </a:r>
+              <a:t>Today’s Demonstration</a:t>
+            </a:r>
+          </a:p>
+        </p:txBody>
+      </p:sp>
+      <p:sp>
+        <p:nvSpPr>
+          <p:cNvPr id="3" name="Content Placeholder 2">
+            <a:extLst>
+              <a:ext uri="{FF2B5EF4-FFF2-40B4-BE49-F238E27FC236}">
+                <a16:creationId xmlns:a16="http://schemas.microsoft.com/office/drawing/2014/main" id="{DAB305CE-FF84-504E-A791-57A99FB1C5BB}"/>
+              </a:ext>
+            </a:extLst>
+          </p:cNvPr>
+          <p:cNvSpPr>
+            <a:spLocks noGrp="1"/>
+          </p:cNvSpPr>
+          <p:nvPr>
+            <p:ph idx="1"/>
+          </p:nvPr>
+        </p:nvSpPr>
+        <p:spPr/>
+        <p:txBody>
+          <a:bodyPr>
+            <a:normAutofit fontScale="92500" lnSpcReduction="10000"/>
+          </a:bodyPr>
+          <a:lstStyle/>
+          <a:p>
+            <a:r>
+              <a:rPr lang="en-US" dirty="0"/>
+              <a:t>What It Won’t Cover</a:t>
+            </a:r>
+          </a:p>
+          <a:p>
+            <a:pPr lvl="1"/>
+            <a:r>
+              <a:rPr lang="en-US" dirty="0"/>
+              <a:t>Advanced Cartography (layout Manager)</a:t>
+            </a:r>
+          </a:p>
+          <a:p>
+            <a:pPr lvl="1"/>
+            <a:r>
+              <a:rPr lang="en-US" dirty="0"/>
+              <a:t>LANDSAT Mineral </a:t>
+            </a:r>
+            <a:r>
+              <a:rPr lang="en-US" dirty="0" err="1"/>
+              <a:t>Epxloration</a:t>
+            </a:r>
+            <a:endParaRPr lang="en-US" dirty="0"/>
+          </a:p>
+          <a:p>
+            <a:pPr lvl="2"/>
+            <a:r>
+              <a:rPr lang="en-US" dirty="0"/>
+              <a:t>Too big a topic to cover in a 2 hour course</a:t>
+            </a:r>
+          </a:p>
+          <a:p>
+            <a:pPr lvl="1"/>
+            <a:r>
+              <a:rPr lang="en-US" dirty="0"/>
+              <a:t>Python in QGIS **in great detail**</a:t>
+            </a:r>
+          </a:p>
+          <a:p>
+            <a:pPr lvl="2"/>
+            <a:r>
+              <a:rPr lang="en-US" dirty="0"/>
+              <a:t>I will show functionality, but once you know the basics, the details are self-explanatory</a:t>
+            </a:r>
+          </a:p>
+          <a:p>
+            <a:r>
+              <a:rPr lang="en-US" dirty="0"/>
+              <a:t>What It Will Cover</a:t>
+            </a:r>
+          </a:p>
+          <a:p>
+            <a:pPr lvl="1"/>
+            <a:r>
+              <a:rPr lang="en-US" i="1" dirty="0"/>
+              <a:t>**Layout Management and Map Creation**</a:t>
+            </a:r>
+          </a:p>
+          <a:p>
+            <a:pPr lvl="1"/>
+            <a:r>
+              <a:rPr lang="en-US" dirty="0"/>
+              <a:t>Multiple Data Types Handling/Conversion</a:t>
+            </a:r>
+          </a:p>
+          <a:p>
+            <a:pPr lvl="1"/>
+            <a:r>
+              <a:rPr lang="en-US" dirty="0"/>
+              <a:t>CSV + Raster Manipulation</a:t>
+            </a:r>
+          </a:p>
+          <a:p>
+            <a:pPr lvl="1"/>
+            <a:r>
+              <a:rPr lang="en-US" dirty="0" err="1"/>
+              <a:t>Geostatistics</a:t>
+            </a:r>
+            <a:endParaRPr lang="en-US" dirty="0"/>
+          </a:p>
+          <a:p>
+            <a:pPr lvl="1"/>
+            <a:r>
+              <a:rPr lang="en-US" dirty="0"/>
+              <a:t>Raster Statistics + Zonal Statistics</a:t>
+            </a:r>
+          </a:p>
+          <a:p>
+            <a:pPr lvl="1"/>
+            <a:r>
+              <a:rPr lang="en-US" dirty="0"/>
+              <a:t>Advanced Formatting + Symbology</a:t>
+            </a:r>
+          </a:p>
+          <a:p>
+            <a:pPr lvl="1"/>
+            <a:r>
+              <a:rPr lang="en-US" dirty="0"/>
+              <a:t>DEM Visualization</a:t>
+            </a:r>
+          </a:p>
+          <a:p>
+            <a:pPr lvl="1"/>
+            <a:r>
+              <a:rPr lang="en-US" dirty="0"/>
+              <a:t>Web Database Connections</a:t>
+            </a:r>
+          </a:p>
+          <a:p>
+            <a:pPr lvl="1"/>
+            <a:r>
+              <a:rPr lang="en-US" dirty="0"/>
+              <a:t>Basics of Python in QGIS</a:t>
+            </a:r>
+          </a:p>
+          <a:p>
+            <a:pPr lvl="2"/>
+            <a:endParaRPr lang="en-US" dirty="0"/>
+          </a:p>
+          <a:p>
+            <a:pPr marL="548640" lvl="2" indent="0">
+              <a:buNone/>
+            </a:pPr>
+            <a:endParaRPr lang="en-US" dirty="0"/>
           </a:p>
         </p:txBody>
       </p:sp>
@@ -9369,7 +9821,7 @@
           <p:cNvPr id="4" name="Date Placeholder 3">
             <a:extLst>
               <a:ext uri="{FF2B5EF4-FFF2-40B4-BE49-F238E27FC236}">
-                <a16:creationId xmlns:a16="http://schemas.microsoft.com/office/drawing/2014/main" id="{7DA4649F-889A-6546-8E0B-F5FD3539BC5C}"/>
+                <a16:creationId xmlns:a16="http://schemas.microsoft.com/office/drawing/2014/main" id="{9832673E-13E5-EB44-B5EE-749A920CDFC9}"/>
               </a:ext>
             </a:extLst>
           </p:cNvPr>
@@ -9395,10 +9847,10 @@
       </p:sp>
       <p:sp>
         <p:nvSpPr>
-          <p:cNvPr id="5" name="Slide Number Placeholder 4">
+          <p:cNvPr id="6" name="Slide Number Placeholder 5">
             <a:extLst>
               <a:ext uri="{FF2B5EF4-FFF2-40B4-BE49-F238E27FC236}">
-                <a16:creationId xmlns:a16="http://schemas.microsoft.com/office/drawing/2014/main" id="{F9504AF3-27B4-6B4E-83B8-B4BC988C5459}"/>
+                <a16:creationId xmlns:a16="http://schemas.microsoft.com/office/drawing/2014/main" id="{3A4F7F12-B06E-6549-B7D9-357DB5A064CB}"/>
               </a:ext>
             </a:extLst>
           </p:cNvPr>
@@ -9426,10 +9878,10 @@
       </p:sp>
       <p:sp>
         <p:nvSpPr>
-          <p:cNvPr id="6" name="Footer Placeholder 5">
+          <p:cNvPr id="7" name="Footer Placeholder 4">
             <a:extLst>
               <a:ext uri="{FF2B5EF4-FFF2-40B4-BE49-F238E27FC236}">
-                <a16:creationId xmlns:a16="http://schemas.microsoft.com/office/drawing/2014/main" id="{55D0A802-D94A-6140-A981-75D69F6B41BB}"/>
+                <a16:creationId xmlns:a16="http://schemas.microsoft.com/office/drawing/2014/main" id="{02C3649A-5040-F04B-A726-FEA28F3C30FF}"/>
               </a:ext>
             </a:extLst>
           </p:cNvPr>
@@ -9440,144 +9892,37 @@
             <p:ph type="ftr" sz="quarter" idx="3"/>
           </p:nvPr>
         </p:nvSpPr>
-        <p:spPr/>
+        <p:spPr>
+          <a:xfrm rot="16200000">
+            <a:off x="9390931" y="3548149"/>
+            <a:ext cx="4718224" cy="365125"/>
+          </a:xfrm>
+          <a:prstGeom prst="rect">
+            <a:avLst/>
+          </a:prstGeom>
+        </p:spPr>
         <p:txBody>
           <a:bodyPr/>
-          <a:lstStyle/>
-          <a:p>
-            <a:r>
-              <a:rPr lang="en-US"/>
+          <a:lstStyle>
+            <a:lvl1pPr>
+              <a:defRPr sz="1200">
+                <a:solidFill>
+                  <a:schemeClr val="bg1"/>
+                </a:solidFill>
+                <a:latin typeface="Candara" panose="020E0502030303020204" pitchFamily="34" charset="0"/>
+              </a:defRPr>
+            </a:lvl1pPr>
+          </a:lstStyle>
+          <a:p>
+            <a:r>
+              <a:rPr lang="en-US" dirty="0"/>
               <a:t>UCL GIS for Geoscientists- Session 3- Intermediate GIS</a:t>
             </a:r>
           </a:p>
           <a:p>
             <a:r>
-              <a:rPr lang="en-US"/>
+              <a:rPr lang="en-US" dirty="0"/>
               <a:t>Presented by N.D. Barber (Cambridge) ndb38@cam.ac.uk</a:t>
-            </a:r>
-            <a:endParaRPr lang="en-US" dirty="0"/>
-          </a:p>
-        </p:txBody>
-      </p:sp>
-      <p:sp>
-        <p:nvSpPr>
-          <p:cNvPr id="7" name="Content Placeholder 2">
-            <a:extLst>
-              <a:ext uri="{FF2B5EF4-FFF2-40B4-BE49-F238E27FC236}">
-                <a16:creationId xmlns:a16="http://schemas.microsoft.com/office/drawing/2014/main" id="{C5D51057-382C-7D44-8954-98B01AFB2D75}"/>
-              </a:ext>
-            </a:extLst>
-          </p:cNvPr>
-          <p:cNvSpPr>
-            <a:spLocks noGrp="1"/>
-          </p:cNvSpPr>
-          <p:nvPr>
-            <p:ph idx="1"/>
-          </p:nvPr>
-        </p:nvSpPr>
-        <p:spPr>
-          <a:xfrm>
-            <a:off x="1261872" y="1828800"/>
-            <a:ext cx="8595360" cy="4351337"/>
-          </a:xfrm>
-        </p:spPr>
-        <p:txBody>
-          <a:bodyPr/>
-          <a:lstStyle/>
-          <a:p>
-            <a:r>
-              <a:rPr lang="en-US" dirty="0"/>
-              <a:t>Elements we want:</a:t>
-            </a:r>
-          </a:p>
-          <a:p>
-            <a:pPr lvl="1"/>
-            <a:r>
-              <a:rPr lang="en-US" dirty="0"/>
-              <a:t>Main Map</a:t>
-            </a:r>
-          </a:p>
-          <a:p>
-            <a:pPr lvl="1"/>
-            <a:r>
-              <a:rPr lang="en-US" dirty="0"/>
-              <a:t>Regional Inset Map</a:t>
-            </a:r>
-          </a:p>
-          <a:p>
-            <a:pPr lvl="1"/>
-            <a:r>
-              <a:rPr lang="en-US" dirty="0"/>
-              <a:t>Legend</a:t>
-            </a:r>
-          </a:p>
-          <a:p>
-            <a:pPr lvl="1"/>
-            <a:r>
-              <a:rPr lang="en-US" dirty="0"/>
-              <a:t>North Arrow</a:t>
-            </a:r>
-          </a:p>
-          <a:p>
-            <a:pPr lvl="1"/>
-            <a:r>
-              <a:rPr lang="en-US" dirty="0"/>
-              <a:t>Scale bar</a:t>
-            </a:r>
-          </a:p>
-          <a:p>
-            <a:pPr lvl="1"/>
-            <a:r>
-              <a:rPr lang="en-US" dirty="0"/>
-              <a:t>Grid</a:t>
-            </a:r>
-          </a:p>
-          <a:p>
-            <a:pPr lvl="1"/>
-            <a:r>
-              <a:rPr lang="en-US" dirty="0"/>
-              <a:t>Labels for important features</a:t>
-            </a:r>
-          </a:p>
-          <a:p>
-            <a:pPr lvl="1"/>
-            <a:r>
-              <a:rPr lang="en-US" dirty="0"/>
-              <a:t>Text box summarizing findings</a:t>
-            </a:r>
-          </a:p>
-          <a:p>
-            <a:r>
-              <a:rPr lang="en-US" dirty="0"/>
-              <a:t>Thigs to keep in mind:</a:t>
-            </a:r>
-          </a:p>
-          <a:p>
-            <a:pPr lvl="1"/>
-            <a:r>
-              <a:rPr lang="en-US" dirty="0"/>
-              <a:t>Map Scale</a:t>
-            </a:r>
-          </a:p>
-          <a:p>
-            <a:pPr lvl="1"/>
-            <a:r>
-              <a:rPr lang="en-US" dirty="0"/>
-              <a:t>Locking of display</a:t>
-            </a:r>
-          </a:p>
-          <a:p>
-            <a:pPr lvl="1"/>
-            <a:r>
-              <a:rPr lang="en-US" dirty="0"/>
-              <a:t>Legend items</a:t>
-            </a:r>
-          </a:p>
-          <a:p>
-            <a:pPr lvl="1"/>
-            <a:r>
-              <a:rPr lang="en-US" dirty="0"/>
-              <a:t>Aesthetic value</a:t>
             </a:r>
           </a:p>
         </p:txBody>
@@ -9585,7 +9930,7 @@
     </p:spTree>
     <p:extLst>
       <p:ext uri="{BB962C8B-B14F-4D97-AF65-F5344CB8AC3E}">
-        <p14:creationId xmlns:p14="http://schemas.microsoft.com/office/powerpoint/2010/main" val="2959314020"/>
+        <p14:creationId xmlns:p14="http://schemas.microsoft.com/office/powerpoint/2010/main" val="1109333282"/>
       </p:ext>
     </p:extLst>
   </p:cSld>
@@ -9617,6 +9962,289 @@
           <p:cNvPr id="2" name="Title 1">
             <a:extLst>
               <a:ext uri="{FF2B5EF4-FFF2-40B4-BE49-F238E27FC236}">
+                <a16:creationId xmlns:a16="http://schemas.microsoft.com/office/drawing/2014/main" id="{59A8B2AC-352B-8F4A-9D7A-6C546DE1107B}"/>
+              </a:ext>
+            </a:extLst>
+          </p:cNvPr>
+          <p:cNvSpPr>
+            <a:spLocks noGrp="1"/>
+          </p:cNvSpPr>
+          <p:nvPr>
+            <p:ph type="title"/>
+          </p:nvPr>
+        </p:nvSpPr>
+        <p:spPr/>
+        <p:txBody>
+          <a:bodyPr/>
+          <a:lstStyle/>
+          <a:p>
+            <a:r>
+              <a:rPr lang="en-US" dirty="0"/>
+              <a:t>Finishing Up From Session 2: </a:t>
+            </a:r>
+            <a:br>
+              <a:rPr lang="en-US" dirty="0"/>
+            </a:br>
+            <a:r>
+              <a:rPr lang="en-US" dirty="0"/>
+              <a:t>Layout</a:t>
+            </a:r>
+          </a:p>
+        </p:txBody>
+      </p:sp>
+      <p:sp>
+        <p:nvSpPr>
+          <p:cNvPr id="4" name="Date Placeholder 3">
+            <a:extLst>
+              <a:ext uri="{FF2B5EF4-FFF2-40B4-BE49-F238E27FC236}">
+                <a16:creationId xmlns:a16="http://schemas.microsoft.com/office/drawing/2014/main" id="{7DA4649F-889A-6546-8E0B-F5FD3539BC5C}"/>
+              </a:ext>
+            </a:extLst>
+          </p:cNvPr>
+          <p:cNvSpPr>
+            <a:spLocks noGrp="1"/>
+          </p:cNvSpPr>
+          <p:nvPr>
+            <p:ph type="dt" sz="half" idx="10"/>
+          </p:nvPr>
+        </p:nvSpPr>
+        <p:spPr/>
+        <p:txBody>
+          <a:bodyPr/>
+          <a:lstStyle/>
+          <a:p>
+            <a:fld id="{0C058645-6F24-9C43-8FC3-443F02031404}" type="datetime1">
+              <a:rPr lang="en-US" smtClean="0"/>
+              <a:t>8/17/20</a:t>
+            </a:fld>
+            <a:endParaRPr lang="en-US" dirty="0"/>
+          </a:p>
+        </p:txBody>
+      </p:sp>
+      <p:sp>
+        <p:nvSpPr>
+          <p:cNvPr id="5" name="Slide Number Placeholder 4">
+            <a:extLst>
+              <a:ext uri="{FF2B5EF4-FFF2-40B4-BE49-F238E27FC236}">
+                <a16:creationId xmlns:a16="http://schemas.microsoft.com/office/drawing/2014/main" id="{F9504AF3-27B4-6B4E-83B8-B4BC988C5459}"/>
+              </a:ext>
+            </a:extLst>
+          </p:cNvPr>
+          <p:cNvSpPr>
+            <a:spLocks noGrp="1"/>
+          </p:cNvSpPr>
+          <p:nvPr>
+            <p:ph type="sldNum" sz="quarter" idx="12"/>
+          </p:nvPr>
+        </p:nvSpPr>
+        <p:spPr/>
+        <p:txBody>
+          <a:bodyPr>
+            <a:normAutofit lnSpcReduction="10000"/>
+          </a:bodyPr>
+          <a:lstStyle/>
+          <a:p>
+            <a:fld id="{4FAB73BC-B049-4115-A692-8D63A059BFB8}" type="slidenum">
+              <a:rPr lang="en-US" smtClean="0"/>
+              <a:t>6</a:t>
+            </a:fld>
+            <a:endParaRPr lang="en-US" dirty="0"/>
+          </a:p>
+        </p:txBody>
+      </p:sp>
+      <p:sp>
+        <p:nvSpPr>
+          <p:cNvPr id="6" name="Footer Placeholder 5">
+            <a:extLst>
+              <a:ext uri="{FF2B5EF4-FFF2-40B4-BE49-F238E27FC236}">
+                <a16:creationId xmlns:a16="http://schemas.microsoft.com/office/drawing/2014/main" id="{55D0A802-D94A-6140-A981-75D69F6B41BB}"/>
+              </a:ext>
+            </a:extLst>
+          </p:cNvPr>
+          <p:cNvSpPr>
+            <a:spLocks noGrp="1"/>
+          </p:cNvSpPr>
+          <p:nvPr>
+            <p:ph type="ftr" sz="quarter" idx="3"/>
+          </p:nvPr>
+        </p:nvSpPr>
+        <p:spPr/>
+        <p:txBody>
+          <a:bodyPr/>
+          <a:lstStyle/>
+          <a:p>
+            <a:r>
+              <a:rPr lang="en-US"/>
+              <a:t>UCL GIS for Geoscientists- Session 3- Intermediate GIS</a:t>
+            </a:r>
+          </a:p>
+          <a:p>
+            <a:r>
+              <a:rPr lang="en-US"/>
+              <a:t>Presented by N.D. Barber (Cambridge) ndb38@cam.ac.uk</a:t>
+            </a:r>
+            <a:endParaRPr lang="en-US" dirty="0"/>
+          </a:p>
+        </p:txBody>
+      </p:sp>
+      <p:sp>
+        <p:nvSpPr>
+          <p:cNvPr id="7" name="Content Placeholder 2">
+            <a:extLst>
+              <a:ext uri="{FF2B5EF4-FFF2-40B4-BE49-F238E27FC236}">
+                <a16:creationId xmlns:a16="http://schemas.microsoft.com/office/drawing/2014/main" id="{C5D51057-382C-7D44-8954-98B01AFB2D75}"/>
+              </a:ext>
+            </a:extLst>
+          </p:cNvPr>
+          <p:cNvSpPr>
+            <a:spLocks noGrp="1"/>
+          </p:cNvSpPr>
+          <p:nvPr>
+            <p:ph idx="1"/>
+          </p:nvPr>
+        </p:nvSpPr>
+        <p:spPr>
+          <a:xfrm>
+            <a:off x="1261872" y="1828800"/>
+            <a:ext cx="8595360" cy="4351337"/>
+          </a:xfrm>
+        </p:spPr>
+        <p:txBody>
+          <a:bodyPr/>
+          <a:lstStyle/>
+          <a:p>
+            <a:r>
+              <a:rPr lang="en-US" dirty="0"/>
+              <a:t>Elements we want:</a:t>
+            </a:r>
+          </a:p>
+          <a:p>
+            <a:pPr lvl="1"/>
+            <a:r>
+              <a:rPr lang="en-US" dirty="0"/>
+              <a:t>Main Map</a:t>
+            </a:r>
+          </a:p>
+          <a:p>
+            <a:pPr lvl="1"/>
+            <a:r>
+              <a:rPr lang="en-US" dirty="0"/>
+              <a:t>Regional Inset Map</a:t>
+            </a:r>
+          </a:p>
+          <a:p>
+            <a:pPr lvl="1"/>
+            <a:r>
+              <a:rPr lang="en-US" dirty="0"/>
+              <a:t>Legend</a:t>
+            </a:r>
+          </a:p>
+          <a:p>
+            <a:pPr lvl="1"/>
+            <a:r>
+              <a:rPr lang="en-US" dirty="0"/>
+              <a:t>North Arrow</a:t>
+            </a:r>
+          </a:p>
+          <a:p>
+            <a:pPr lvl="1"/>
+            <a:r>
+              <a:rPr lang="en-US" dirty="0"/>
+              <a:t>Scale bar</a:t>
+            </a:r>
+          </a:p>
+          <a:p>
+            <a:pPr lvl="1"/>
+            <a:r>
+              <a:rPr lang="en-US" dirty="0"/>
+              <a:t>Grid</a:t>
+            </a:r>
+          </a:p>
+          <a:p>
+            <a:pPr lvl="1"/>
+            <a:r>
+              <a:rPr lang="en-US" dirty="0"/>
+              <a:t>Labels for important features</a:t>
+            </a:r>
+          </a:p>
+          <a:p>
+            <a:pPr lvl="1"/>
+            <a:r>
+              <a:rPr lang="en-US" dirty="0"/>
+              <a:t>Text box summarizing findings</a:t>
+            </a:r>
+          </a:p>
+          <a:p>
+            <a:r>
+              <a:rPr lang="en-US" dirty="0"/>
+              <a:t>Thigs to keep in mind:</a:t>
+            </a:r>
+          </a:p>
+          <a:p>
+            <a:pPr lvl="1"/>
+            <a:r>
+              <a:rPr lang="en-US" dirty="0"/>
+              <a:t>Map Scale</a:t>
+            </a:r>
+          </a:p>
+          <a:p>
+            <a:pPr lvl="1"/>
+            <a:r>
+              <a:rPr lang="en-US" dirty="0"/>
+              <a:t>Locking of display</a:t>
+            </a:r>
+          </a:p>
+          <a:p>
+            <a:pPr lvl="1"/>
+            <a:r>
+              <a:rPr lang="en-US" dirty="0"/>
+              <a:t>Legend items</a:t>
+            </a:r>
+          </a:p>
+          <a:p>
+            <a:pPr lvl="1"/>
+            <a:r>
+              <a:rPr lang="en-US" dirty="0"/>
+              <a:t>Aesthetic value</a:t>
+            </a:r>
+          </a:p>
+        </p:txBody>
+      </p:sp>
+    </p:spTree>
+    <p:extLst>
+      <p:ext uri="{BB962C8B-B14F-4D97-AF65-F5344CB8AC3E}">
+        <p14:creationId xmlns:p14="http://schemas.microsoft.com/office/powerpoint/2010/main" val="2959314020"/>
+      </p:ext>
+    </p:extLst>
+  </p:cSld>
+  <p:clrMapOvr>
+    <a:masterClrMapping/>
+  </p:clrMapOvr>
+</p:sld>
+</file>
+
+<file path=ppt/slides/slide8.xml><?xml version="1.0" encoding="utf-8"?>
+<p:sld xmlns:a="http://schemas.openxmlformats.org/drawingml/2006/main" xmlns:r="http://schemas.openxmlformats.org/officeDocument/2006/relationships" xmlns:p="http://schemas.openxmlformats.org/presentationml/2006/main">
+  <p:cSld>
+    <p:spTree>
+      <p:nvGrpSpPr>
+        <p:cNvPr id="1" name=""/>
+        <p:cNvGrpSpPr/>
+        <p:nvPr/>
+      </p:nvGrpSpPr>
+      <p:grpSpPr>
+        <a:xfrm>
+          <a:off x="0" y="0"/>
+          <a:ext cx="0" cy="0"/>
+          <a:chOff x="0" y="0"/>
+          <a:chExt cx="0" cy="0"/>
+        </a:xfrm>
+      </p:grpSpPr>
+      <p:sp>
+        <p:nvSpPr>
+          <p:cNvPr id="2" name="Title 1">
+            <a:extLst>
+              <a:ext uri="{FF2B5EF4-FFF2-40B4-BE49-F238E27FC236}">
                 <a16:creationId xmlns:a16="http://schemas.microsoft.com/office/drawing/2014/main" id="{8CD2B2F7-7C36-004D-917B-D978CFAA84D3}"/>
               </a:ext>
             </a:extLst>
@@ -9792,7 +10420,7 @@
           <a:p>
             <a:fld id="{4FAB73BC-B049-4115-A692-8D63A059BFB8}" type="slidenum">
               <a:rPr lang="en-US" smtClean="0"/>
-              <a:t>6</a:t>
+              <a:t>7</a:t>
             </a:fld>
             <a:endParaRPr lang="en-US" dirty="0"/>
           </a:p>
@@ -10232,203 +10860,6 @@
 </p:sld>
 </file>
 
-<file path=ppt/slides/slide8.xml><?xml version="1.0" encoding="utf-8"?>
-<p:sld xmlns:a="http://schemas.openxmlformats.org/drawingml/2006/main" xmlns:r="http://schemas.openxmlformats.org/officeDocument/2006/relationships" xmlns:p="http://schemas.openxmlformats.org/presentationml/2006/main">
-  <p:cSld>
-    <p:spTree>
-      <p:nvGrpSpPr>
-        <p:cNvPr id="1" name=""/>
-        <p:cNvGrpSpPr/>
-        <p:nvPr/>
-      </p:nvGrpSpPr>
-      <p:grpSpPr>
-        <a:xfrm>
-          <a:off x="0" y="0"/>
-          <a:ext cx="0" cy="0"/>
-          <a:chOff x="0" y="0"/>
-          <a:chExt cx="0" cy="0"/>
-        </a:xfrm>
-      </p:grpSpPr>
-      <p:sp>
-        <p:nvSpPr>
-          <p:cNvPr id="2" name="Title 1">
-            <a:extLst>
-              <a:ext uri="{FF2B5EF4-FFF2-40B4-BE49-F238E27FC236}">
-                <a16:creationId xmlns:a16="http://schemas.microsoft.com/office/drawing/2014/main" id="{6885F1C6-366C-E241-A164-6D3AE2E3CCDB}"/>
-              </a:ext>
-            </a:extLst>
-          </p:cNvPr>
-          <p:cNvSpPr>
-            <a:spLocks noGrp="1"/>
-          </p:cNvSpPr>
-          <p:nvPr>
-            <p:ph type="title"/>
-          </p:nvPr>
-        </p:nvSpPr>
-        <p:spPr/>
-        <p:txBody>
-          <a:bodyPr/>
-          <a:lstStyle/>
-          <a:p>
-            <a:r>
-              <a:rPr lang="en-US" dirty="0"/>
-              <a:t>Session 3, Section 1</a:t>
-            </a:r>
-          </a:p>
-        </p:txBody>
-      </p:sp>
-      <p:sp>
-        <p:nvSpPr>
-          <p:cNvPr id="3" name="Text Placeholder 2">
-            <a:extLst>
-              <a:ext uri="{FF2B5EF4-FFF2-40B4-BE49-F238E27FC236}">
-                <a16:creationId xmlns:a16="http://schemas.microsoft.com/office/drawing/2014/main" id="{0E47BC1A-8F83-1544-9036-E4F7D93B9603}"/>
-              </a:ext>
-            </a:extLst>
-          </p:cNvPr>
-          <p:cNvSpPr>
-            <a:spLocks noGrp="1"/>
-          </p:cNvSpPr>
-          <p:nvPr>
-            <p:ph type="body" idx="1"/>
-          </p:nvPr>
-        </p:nvSpPr>
-        <p:spPr/>
-        <p:txBody>
-          <a:bodyPr/>
-          <a:lstStyle/>
-          <a:p>
-            <a:r>
-              <a:rPr lang="en-US" dirty="0"/>
-              <a:t>Handling Difficult Data Imports, Spatial Joins, Interpolating between Points, Raster Calculator, Spatial Statistics</a:t>
-            </a:r>
-          </a:p>
-        </p:txBody>
-      </p:sp>
-      <p:sp>
-        <p:nvSpPr>
-          <p:cNvPr id="4" name="Date Placeholder 3">
-            <a:extLst>
-              <a:ext uri="{FF2B5EF4-FFF2-40B4-BE49-F238E27FC236}">
-                <a16:creationId xmlns:a16="http://schemas.microsoft.com/office/drawing/2014/main" id="{C4A35221-BD0E-8542-998C-09AD6324709F}"/>
-              </a:ext>
-            </a:extLst>
-          </p:cNvPr>
-          <p:cNvSpPr>
-            <a:spLocks noGrp="1"/>
-          </p:cNvSpPr>
-          <p:nvPr>
-            <p:ph type="dt" sz="half" idx="10"/>
-          </p:nvPr>
-        </p:nvSpPr>
-        <p:spPr/>
-        <p:txBody>
-          <a:bodyPr/>
-          <a:lstStyle/>
-          <a:p>
-            <a:fld id="{453754D5-8BE9-294A-B481-283E1E39E0CC}" type="datetime1">
-              <a:rPr lang="en-US" smtClean="0"/>
-              <a:t>8/17/20</a:t>
-            </a:fld>
-            <a:endParaRPr lang="en-US" dirty="0"/>
-          </a:p>
-        </p:txBody>
-      </p:sp>
-      <p:sp>
-        <p:nvSpPr>
-          <p:cNvPr id="5" name="Slide Number Placeholder 4">
-            <a:extLst>
-              <a:ext uri="{FF2B5EF4-FFF2-40B4-BE49-F238E27FC236}">
-                <a16:creationId xmlns:a16="http://schemas.microsoft.com/office/drawing/2014/main" id="{5CD22ED2-F181-FC41-A3F5-24594041E412}"/>
-              </a:ext>
-            </a:extLst>
-          </p:cNvPr>
-          <p:cNvSpPr>
-            <a:spLocks noGrp="1"/>
-          </p:cNvSpPr>
-          <p:nvPr>
-            <p:ph type="sldNum" sz="quarter" idx="12"/>
-          </p:nvPr>
-        </p:nvSpPr>
-        <p:spPr/>
-        <p:txBody>
-          <a:bodyPr>
-            <a:normAutofit lnSpcReduction="10000"/>
-          </a:bodyPr>
-          <a:lstStyle/>
-          <a:p>
-            <a:fld id="{4FAB73BC-B049-4115-A692-8D63A059BFB8}" type="slidenum">
-              <a:rPr lang="en-US" smtClean="0"/>
-              <a:t>7</a:t>
-            </a:fld>
-            <a:endParaRPr lang="en-US" dirty="0"/>
-          </a:p>
-        </p:txBody>
-      </p:sp>
-      <p:sp>
-        <p:nvSpPr>
-          <p:cNvPr id="6" name="Footer Placeholder 4">
-            <a:extLst>
-              <a:ext uri="{FF2B5EF4-FFF2-40B4-BE49-F238E27FC236}">
-                <a16:creationId xmlns:a16="http://schemas.microsoft.com/office/drawing/2014/main" id="{3B38966E-3A08-584B-A0F8-2F6BB46E163E}"/>
-              </a:ext>
-            </a:extLst>
-          </p:cNvPr>
-          <p:cNvSpPr>
-            <a:spLocks noGrp="1"/>
-          </p:cNvSpPr>
-          <p:nvPr>
-            <p:ph type="ftr" sz="quarter" idx="3"/>
-          </p:nvPr>
-        </p:nvSpPr>
-        <p:spPr>
-          <a:xfrm rot="16200000">
-            <a:off x="9390931" y="3548149"/>
-            <a:ext cx="4718224" cy="365125"/>
-          </a:xfrm>
-          <a:prstGeom prst="rect">
-            <a:avLst/>
-          </a:prstGeom>
-        </p:spPr>
-        <p:txBody>
-          <a:bodyPr/>
-          <a:lstStyle>
-            <a:lvl1pPr>
-              <a:defRPr sz="1200">
-                <a:solidFill>
-                  <a:schemeClr val="bg1"/>
-                </a:solidFill>
-                <a:latin typeface="Candara" panose="020E0502030303020204" pitchFamily="34" charset="0"/>
-              </a:defRPr>
-            </a:lvl1pPr>
-          </a:lstStyle>
-          <a:p>
-            <a:r>
-              <a:rPr lang="en-US" dirty="0"/>
-              <a:t>UCL GIS for Geoscientists- Session 3- Intermediate GIS</a:t>
-            </a:r>
-          </a:p>
-          <a:p>
-            <a:r>
-              <a:rPr lang="en-US" dirty="0"/>
-              <a:t>Presented by N.D. Barber (Cambridge) ndb38@cam.ac.uk</a:t>
-            </a:r>
-          </a:p>
-        </p:txBody>
-      </p:sp>
-    </p:spTree>
-    <p:extLst>
-      <p:ext uri="{BB962C8B-B14F-4D97-AF65-F5344CB8AC3E}">
-        <p14:creationId xmlns:p14="http://schemas.microsoft.com/office/powerpoint/2010/main" val="366334908"/>
-      </p:ext>
-    </p:extLst>
-  </p:cSld>
-  <p:clrMapOvr>
-    <a:masterClrMapping/>
-  </p:clrMapOvr>
-</p:sld>
-</file>
-
 <file path=ppt/slides/slide9.xml><?xml version="1.0" encoding="utf-8"?>
 <p:sld xmlns:a="http://schemas.openxmlformats.org/drawingml/2006/main" xmlns:r="http://schemas.openxmlformats.org/officeDocument/2006/relationships" xmlns:p="http://schemas.openxmlformats.org/presentationml/2006/main">
   <p:cSld>
@@ -10451,7 +10882,7 @@
           <p:cNvPr id="2" name="Title 1">
             <a:extLst>
               <a:ext uri="{FF2B5EF4-FFF2-40B4-BE49-F238E27FC236}">
-                <a16:creationId xmlns:a16="http://schemas.microsoft.com/office/drawing/2014/main" id="{FD6C7A8A-0B0E-BC40-BBB3-A2EBA505A425}"/>
+                <a16:creationId xmlns:a16="http://schemas.microsoft.com/office/drawing/2014/main" id="{6885F1C6-366C-E241-A164-6D3AE2E3CCDB}"/>
               </a:ext>
             </a:extLst>
           </p:cNvPr>
@@ -10468,19 +10899,18 @@
           <a:lstStyle/>
           <a:p>
             <a:r>
-              <a:rPr lang="en-US" dirty="0" err="1"/>
-              <a:t>Geostatistics</a:t>
-            </a:r>
-            <a:endParaRPr lang="en-US" dirty="0"/>
-          </a:p>
-        </p:txBody>
-      </p:sp>
-      <p:sp>
-        <p:nvSpPr>
-          <p:cNvPr id="3" name="Content Placeholder 2">
+              <a:rPr lang="en-US" dirty="0"/>
+              <a:t>Session 3, Section 1</a:t>
+            </a:r>
+          </a:p>
+        </p:txBody>
+      </p:sp>
+      <p:sp>
+        <p:nvSpPr>
+          <p:cNvPr id="3" name="Text Placeholder 2">
             <a:extLst>
               <a:ext uri="{FF2B5EF4-FFF2-40B4-BE49-F238E27FC236}">
-                <a16:creationId xmlns:a16="http://schemas.microsoft.com/office/drawing/2014/main" id="{A427FE3F-49D5-C247-8E68-29AF7BBD2494}"/>
+                <a16:creationId xmlns:a16="http://schemas.microsoft.com/office/drawing/2014/main" id="{0E47BC1A-8F83-1544-9036-E4F7D93B9603}"/>
               </a:ext>
             </a:extLst>
           </p:cNvPr>
@@ -10488,76 +10918,17 @@
             <a:spLocks noGrp="1"/>
           </p:cNvSpPr>
           <p:nvPr>
-            <p:ph idx="1"/>
-          </p:nvPr>
-        </p:nvSpPr>
-        <p:spPr>
-          <a:xfrm>
-            <a:off x="1261872" y="1828800"/>
-            <a:ext cx="4636008" cy="4351337"/>
-          </a:xfrm>
-        </p:spPr>
+            <p:ph type="body" idx="1"/>
+          </p:nvPr>
+        </p:nvSpPr>
+        <p:spPr/>
         <p:txBody>
           <a:bodyPr/>
           <a:lstStyle/>
           <a:p>
             <a:r>
               <a:rPr lang="en-US" dirty="0"/>
-              <a:t>Free AMAZING resource: </a:t>
-            </a:r>
-            <a:r>
-              <a:rPr lang="en-US" dirty="0">
-                <a:hlinkClick r:id="rId2"/>
-              </a:rPr>
-              <a:t>https://www.spatialanalysisonline.com/HTML/index.html</a:t>
-            </a:r>
-            <a:endParaRPr lang="en-US" dirty="0"/>
-          </a:p>
-          <a:p>
-            <a:r>
-              <a:rPr lang="en-US" dirty="0"/>
-              <a:t>One key feature of spatial statistics: because of </a:t>
-            </a:r>
-            <a:r>
-              <a:rPr lang="en-US" i="1" dirty="0"/>
-              <a:t>spatial autocorrelation</a:t>
-            </a:r>
-            <a:r>
-              <a:rPr lang="en-US" dirty="0"/>
-              <a:t>, </a:t>
-            </a:r>
-            <a:r>
-              <a:rPr lang="en-US" u="sng" dirty="0"/>
-              <a:t>data with a spatial dimension violate classical statistical assumption of independence</a:t>
-            </a:r>
-          </a:p>
-          <a:p>
-            <a:pPr lvl="1"/>
-            <a:r>
-              <a:rPr lang="en-US" dirty="0"/>
-              <a:t>Requires different approach to statistics and analysis</a:t>
-            </a:r>
-          </a:p>
-          <a:p>
-            <a:r>
-              <a:rPr lang="en-US" dirty="0"/>
-              <a:t>Special geostatistical operations: Inverse Distance Weighting (IDW), Kriging, Moran’s I coefficient </a:t>
-            </a:r>
-          </a:p>
-          <a:p>
-            <a:r>
-              <a:rPr lang="en-US" dirty="0"/>
-              <a:t>My Deccan work: </a:t>
-            </a:r>
-            <a:r>
-              <a:rPr lang="en-US" dirty="0">
-                <a:hlinkClick r:id="rId3"/>
-              </a:rPr>
-              <a:t>Empirical Bayesian Kriging</a:t>
-            </a:r>
-            <a:r>
-              <a:rPr lang="en-US" dirty="0"/>
-              <a:t> (EBK) &gt;&gt;&gt;&gt;</a:t>
+              <a:t>Handling Difficult Data Imports, Spatial Joins, Interpolating between Points, Raster Calculator, Spatial Statistics</a:t>
             </a:r>
           </a:p>
         </p:txBody>
@@ -10567,7 +10938,7 @@
           <p:cNvPr id="4" name="Date Placeholder 3">
             <a:extLst>
               <a:ext uri="{FF2B5EF4-FFF2-40B4-BE49-F238E27FC236}">
-                <a16:creationId xmlns:a16="http://schemas.microsoft.com/office/drawing/2014/main" id="{1F076563-1615-8340-8162-97DB4650B039}"/>
+                <a16:creationId xmlns:a16="http://schemas.microsoft.com/office/drawing/2014/main" id="{C4A35221-BD0E-8542-998C-09AD6324709F}"/>
               </a:ext>
             </a:extLst>
           </p:cNvPr>
@@ -10583,7 +10954,7 @@
           <a:bodyPr/>
           <a:lstStyle/>
           <a:p>
-            <a:fld id="{0C058645-6F24-9C43-8FC3-443F02031404}" type="datetime1">
+            <a:fld id="{453754D5-8BE9-294A-B481-283E1E39E0CC}" type="datetime1">
               <a:rPr lang="en-US" smtClean="0"/>
               <a:t>8/17/20</a:t>
             </a:fld>
@@ -10596,7 +10967,7 @@
           <p:cNvPr id="5" name="Slide Number Placeholder 4">
             <a:extLst>
               <a:ext uri="{FF2B5EF4-FFF2-40B4-BE49-F238E27FC236}">
-                <a16:creationId xmlns:a16="http://schemas.microsoft.com/office/drawing/2014/main" id="{12047D6E-3B9E-9E45-918B-52E3DB61B3F1}"/>
+                <a16:creationId xmlns:a16="http://schemas.microsoft.com/office/drawing/2014/main" id="{5CD22ED2-F181-FC41-A3F5-24594041E412}"/>
               </a:ext>
             </a:extLst>
           </p:cNvPr>
@@ -10624,10 +10995,10 @@
       </p:sp>
       <p:sp>
         <p:nvSpPr>
-          <p:cNvPr id="6" name="Footer Placeholder 5">
+          <p:cNvPr id="6" name="Footer Placeholder 4">
             <a:extLst>
               <a:ext uri="{FF2B5EF4-FFF2-40B4-BE49-F238E27FC236}">
-                <a16:creationId xmlns:a16="http://schemas.microsoft.com/office/drawing/2014/main" id="{991F8F88-5852-5C46-AD49-A5AE62269B22}"/>
+                <a16:creationId xmlns:a16="http://schemas.microsoft.com/office/drawing/2014/main" id="{3B38966E-3A08-584B-A0F8-2F6BB46E163E}"/>
               </a:ext>
             </a:extLst>
           </p:cNvPr>
@@ -10638,89 +11009,45 @@
             <p:ph type="ftr" sz="quarter" idx="3"/>
           </p:nvPr>
         </p:nvSpPr>
-        <p:spPr/>
-        <p:txBody>
-          <a:bodyPr/>
-          <a:lstStyle/>
-          <a:p>
-            <a:r>
-              <a:rPr lang="en-US"/>
-              <a:t>UCL GIS for Geoscientists- Session 3- Intermediate GIS</a:t>
-            </a:r>
-          </a:p>
-          <a:p>
-            <a:r>
-              <a:rPr lang="en-US"/>
-              <a:t>Presented by N.D. Barber (Cambridge) ndb38@cam.ac.uk</a:t>
-            </a:r>
-            <a:endParaRPr lang="en-US" dirty="0"/>
-          </a:p>
-        </p:txBody>
-      </p:sp>
-      <p:pic>
-        <p:nvPicPr>
-          <p:cNvPr id="8" name="Picture 7" descr="A screenshot of a cell phone&#10;&#10;Description automatically generated">
-            <a:extLst>
-              <a:ext uri="{FF2B5EF4-FFF2-40B4-BE49-F238E27FC236}">
-                <a16:creationId xmlns:a16="http://schemas.microsoft.com/office/drawing/2014/main" id="{744C8758-BCAA-1046-AB6D-9E6CBB14EF1E}"/>
-              </a:ext>
-            </a:extLst>
-          </p:cNvPr>
-          <p:cNvPicPr>
-            <a:picLocks noChangeAspect="1"/>
-          </p:cNvPicPr>
-          <p:nvPr/>
-        </p:nvPicPr>
-        <p:blipFill>
-          <a:blip r:embed="rId4"/>
-          <a:stretch>
-            <a:fillRect/>
-          </a:stretch>
-        </p:blipFill>
         <p:spPr>
-          <a:xfrm>
-            <a:off x="6376527" y="445567"/>
-            <a:ext cx="4276504" cy="3154496"/>
+          <a:xfrm rot="16200000">
+            <a:off x="9390931" y="3548149"/>
+            <a:ext cx="4718224" cy="365125"/>
           </a:xfrm>
           <a:prstGeom prst="rect">
             <a:avLst/>
           </a:prstGeom>
         </p:spPr>
-      </p:pic>
-      <p:pic>
-        <p:nvPicPr>
-          <p:cNvPr id="9" name="Content Placeholder 7" descr="A close up of a map&#10;&#10;Description automatically generated">
-            <a:extLst>
-              <a:ext uri="{FF2B5EF4-FFF2-40B4-BE49-F238E27FC236}">
-                <a16:creationId xmlns:a16="http://schemas.microsoft.com/office/drawing/2014/main" id="{B33D23CE-246B-A345-85DF-3E495F0D4D49}"/>
-              </a:ext>
-            </a:extLst>
-          </p:cNvPr>
-          <p:cNvPicPr>
-            <a:picLocks noChangeAspect="1"/>
-          </p:cNvPicPr>
-          <p:nvPr/>
-        </p:nvPicPr>
-        <p:blipFill>
-          <a:blip r:embed="rId5"/>
-          <a:stretch>
-            <a:fillRect/>
-          </a:stretch>
-        </p:blipFill>
-        <p:spPr>
-          <a:xfrm>
-            <a:off x="6294122" y="3901438"/>
-            <a:ext cx="4441314" cy="2506875"/>
-          </a:xfrm>
-          <a:prstGeom prst="rect">
-            <a:avLst/>
-          </a:prstGeom>
-        </p:spPr>
-      </p:pic>
+        <p:txBody>
+          <a:bodyPr/>
+          <a:lstStyle>
+            <a:lvl1pPr>
+              <a:defRPr sz="1200">
+                <a:solidFill>
+                  <a:schemeClr val="bg1"/>
+                </a:solidFill>
+                <a:latin typeface="Candara" panose="020E0502030303020204" pitchFamily="34" charset="0"/>
+              </a:defRPr>
+            </a:lvl1pPr>
+          </a:lstStyle>
+          <a:p>
+            <a:r>
+              <a:rPr lang="en-US" dirty="0"/>
+              <a:t>UCL GIS for Geoscientists- Session 3- Intermediate GIS</a:t>
+            </a:r>
+          </a:p>
+          <a:p>
+            <a:r>
+              <a:rPr lang="en-US" dirty="0"/>
+              <a:t>Presented by N.D. Barber (Cambridge) ndb38@cam.ac.uk</a:t>
+            </a:r>
+          </a:p>
+        </p:txBody>
+      </p:sp>
     </p:spTree>
     <p:extLst>
       <p:ext uri="{BB962C8B-B14F-4D97-AF65-F5344CB8AC3E}">
-        <p14:creationId xmlns:p14="http://schemas.microsoft.com/office/powerpoint/2010/main" val="3548231802"/>
+        <p14:creationId xmlns:p14="http://schemas.microsoft.com/office/powerpoint/2010/main" val="366334908"/>
       </p:ext>
     </p:extLst>
   </p:cSld>

</xml_diff>